<commit_message>
Updates Complex Data Modelling presentation
</commit_message>
<xml_diff>
--- a/Complex_Data_Modelling/Complex_Data_Modelling.pptx
+++ b/Complex_Data_Modelling/Complex_Data_Modelling.pptx
@@ -223,7 +223,7 @@
           <a:p>
             <a:fld id="{184EAD20-21E3-4489-9A2E-68C110AD5D79}" type="datetimeFigureOut">
               <a:rPr lang="en-GB" smtClean="0"/>
-              <a:t>6/19/18</a:t>
+              <a:t>6/18/19</a:t>
             </a:fld>
             <a:endParaRPr lang="en-GB" dirty="0"/>
           </a:p>
@@ -1320,7 +1320,7 @@
           <a:p>
             <a:fld id="{DDB1F609-DF0A-431B-B7BF-4A3DF144245D}" type="datetimeFigureOut">
               <a:rPr lang="de-DE" smtClean="0"/>
-              <a:t>6/19/18</a:t>
+              <a:t>6/18/19</a:t>
             </a:fld>
             <a:endParaRPr lang="de-DE" dirty="0"/>
           </a:p>
@@ -1368,6 +1368,36 @@
           </a:p>
         </p:txBody>
       </p:sp>
+      <p:pic>
+        <p:nvPicPr>
+          <p:cNvPr id="18" name="Picture 17" descr="dhis2-logo-rgb-negative.png"/>
+          <p:cNvPicPr>
+            <a:picLocks noChangeAspect="1"/>
+          </p:cNvPicPr>
+          <p:nvPr userDrawn="1"/>
+        </p:nvPicPr>
+        <p:blipFill>
+          <a:blip r:embed="rId2">
+            <a:extLst>
+              <a:ext uri="{28A0092B-C50C-407E-A947-70E740481C1C}">
+                <a14:useLocalDpi xmlns:a14="http://schemas.microsoft.com/office/drawing/2010/main" val="0"/>
+              </a:ext>
+            </a:extLst>
+          </a:blip>
+          <a:stretch>
+            <a:fillRect/>
+          </a:stretch>
+        </p:blipFill>
+        <p:spPr>
+          <a:xfrm>
+            <a:off x="9840416" y="6021288"/>
+            <a:ext cx="2135560" cy="650262"/>
+          </a:xfrm>
+          <a:prstGeom prst="rect">
+            <a:avLst/>
+          </a:prstGeom>
+        </p:spPr>
+      </p:pic>
     </p:spTree>
   </p:cSld>
   <p:clrMapOvr>
@@ -1566,7 +1596,7 @@
           <a:p>
             <a:fld id="{DDB1F609-DF0A-431B-B7BF-4A3DF144245D}" type="datetimeFigureOut">
               <a:rPr lang="de-DE" smtClean="0"/>
-              <a:t>6/19/18</a:t>
+              <a:t>6/18/19</a:t>
             </a:fld>
             <a:endParaRPr lang="de-DE" dirty="0"/>
           </a:p>
@@ -1875,7 +1905,7 @@
           <a:p>
             <a:fld id="{DDB1F609-DF0A-431B-B7BF-4A3DF144245D}" type="datetimeFigureOut">
               <a:rPr lang="de-DE" smtClean="0"/>
-              <a:t>6/19/18</a:t>
+              <a:t>6/18/19</a:t>
             </a:fld>
             <a:endParaRPr lang="de-DE" dirty="0"/>
           </a:p>
@@ -2203,7 +2233,7 @@
           <a:p>
             <a:fld id="{DDB1F609-DF0A-431B-B7BF-4A3DF144245D}" type="datetimeFigureOut">
               <a:rPr lang="de-DE" smtClean="0"/>
-              <a:t>6/19/18</a:t>
+              <a:t>6/18/19</a:t>
             </a:fld>
             <a:endParaRPr lang="de-DE" dirty="0"/>
           </a:p>
@@ -2512,7 +2542,7 @@
           <a:p>
             <a:fld id="{DDB1F609-DF0A-431B-B7BF-4A3DF144245D}" type="datetimeFigureOut">
               <a:rPr lang="de-DE" smtClean="0"/>
-              <a:t>6/19/18</a:t>
+              <a:t>6/18/19</a:t>
             </a:fld>
             <a:endParaRPr lang="de-DE" dirty="0"/>
           </a:p>
@@ -2900,7 +2930,7 @@
           <a:p>
             <a:fld id="{DDB1F609-DF0A-431B-B7BF-4A3DF144245D}" type="datetimeFigureOut">
               <a:rPr lang="de-DE" smtClean="0"/>
-              <a:t>6/19/18</a:t>
+              <a:t>6/18/19</a:t>
             </a:fld>
             <a:endParaRPr lang="de-DE" dirty="0"/>
           </a:p>
@@ -3065,7 +3095,7 @@
           <a:p>
             <a:fld id="{DDB1F609-DF0A-431B-B7BF-4A3DF144245D}" type="datetimeFigureOut">
               <a:rPr lang="de-DE" smtClean="0"/>
-              <a:t>6/19/18</a:t>
+              <a:t>6/18/19</a:t>
             </a:fld>
             <a:endParaRPr lang="de-DE" dirty="0"/>
           </a:p>
@@ -3240,7 +3270,7 @@
           <a:p>
             <a:fld id="{DDB1F609-DF0A-431B-B7BF-4A3DF144245D}" type="datetimeFigureOut">
               <a:rPr lang="de-DE" smtClean="0"/>
-              <a:t>6/19/18</a:t>
+              <a:t>6/18/19</a:t>
             </a:fld>
             <a:endParaRPr lang="de-DE" dirty="0"/>
           </a:p>
@@ -3405,7 +3435,7 @@
           <a:p>
             <a:fld id="{DDB1F609-DF0A-431B-B7BF-4A3DF144245D}" type="datetimeFigureOut">
               <a:rPr lang="de-DE" smtClean="0"/>
-              <a:t>6/19/18</a:t>
+              <a:t>6/18/19</a:t>
             </a:fld>
             <a:endParaRPr lang="de-DE" dirty="0"/>
           </a:p>
@@ -3647,7 +3677,7 @@
           <a:p>
             <a:fld id="{DDB1F609-DF0A-431B-B7BF-4A3DF144245D}" type="datetimeFigureOut">
               <a:rPr lang="de-DE" smtClean="0"/>
-              <a:t>6/19/18</a:t>
+              <a:t>6/18/19</a:t>
             </a:fld>
             <a:endParaRPr lang="de-DE" dirty="0"/>
           </a:p>
@@ -3874,7 +3904,7 @@
           <a:p>
             <a:fld id="{DDB1F609-DF0A-431B-B7BF-4A3DF144245D}" type="datetimeFigureOut">
               <a:rPr lang="de-DE" smtClean="0"/>
-              <a:t>6/19/18</a:t>
+              <a:t>6/18/19</a:t>
             </a:fld>
             <a:endParaRPr lang="de-DE" dirty="0"/>
           </a:p>
@@ -4243,7 +4273,7 @@
           <a:p>
             <a:fld id="{DDB1F609-DF0A-431B-B7BF-4A3DF144245D}" type="datetimeFigureOut">
               <a:rPr lang="de-DE" smtClean="0"/>
-              <a:t>6/19/18</a:t>
+              <a:t>6/18/19</a:t>
             </a:fld>
             <a:endParaRPr lang="de-DE" dirty="0"/>
           </a:p>
@@ -4361,7 +4391,7 @@
           <a:p>
             <a:fld id="{DDB1F609-DF0A-431B-B7BF-4A3DF144245D}" type="datetimeFigureOut">
               <a:rPr lang="de-DE" smtClean="0"/>
-              <a:t>6/19/18</a:t>
+              <a:t>6/18/19</a:t>
             </a:fld>
             <a:endParaRPr lang="de-DE" dirty="0"/>
           </a:p>
@@ -4451,7 +4481,7 @@
           <a:p>
             <a:fld id="{DDB1F609-DF0A-431B-B7BF-4A3DF144245D}" type="datetimeFigureOut">
               <a:rPr lang="de-DE" smtClean="0"/>
-              <a:t>6/19/18</a:t>
+              <a:t>6/18/19</a:t>
             </a:fld>
             <a:endParaRPr lang="de-DE" dirty="0"/>
           </a:p>
@@ -4701,7 +4731,7 @@
           <a:p>
             <a:fld id="{DDB1F609-DF0A-431B-B7BF-4A3DF144245D}" type="datetimeFigureOut">
               <a:rPr lang="de-DE" smtClean="0"/>
-              <a:t>6/19/18</a:t>
+              <a:t>6/18/19</a:t>
             </a:fld>
             <a:endParaRPr lang="de-DE" dirty="0"/>
           </a:p>
@@ -5001,7 +5031,7 @@
           <a:p>
             <a:fld id="{DDB1F609-DF0A-431B-B7BF-4A3DF144245D}" type="datetimeFigureOut">
               <a:rPr lang="de-DE" smtClean="0"/>
-              <a:t>6/19/18</a:t>
+              <a:t>6/18/19</a:t>
             </a:fld>
             <a:endParaRPr lang="de-DE" dirty="0"/>
           </a:p>
@@ -5594,7 +5624,7 @@
           <a:lstStyle/>
           <a:p>
             <a:r>
-              <a:rPr lang="en-US" smtClean="0"/>
+              <a:rPr lang="en-US" dirty="0" smtClean="0"/>
               <a:t>Click to edit Master title style</a:t>
             </a:r>
             <a:endParaRPr lang="en-US" dirty="0"/>
@@ -5698,7 +5728,7 @@
           <a:p>
             <a:fld id="{DDB1F609-DF0A-431B-B7BF-4A3DF144245D}" type="datetimeFigureOut">
               <a:rPr lang="de-DE" smtClean="0"/>
-              <a:t>6/19/18</a:t>
+              <a:t>6/18/19</a:t>
             </a:fld>
             <a:endParaRPr lang="de-DE" dirty="0"/>
           </a:p>
@@ -5780,6 +5810,36 @@
           </a:p>
         </p:txBody>
       </p:sp>
+      <p:pic>
+        <p:nvPicPr>
+          <p:cNvPr id="18" name="Picture 17" descr="dhis2-logo-rgb-negative.png"/>
+          <p:cNvPicPr>
+            <a:picLocks noChangeAspect="1"/>
+          </p:cNvPicPr>
+          <p:nvPr userDrawn="1"/>
+        </p:nvPicPr>
+        <p:blipFill>
+          <a:blip r:embed="rId18">
+            <a:extLst>
+              <a:ext uri="{28A0092B-C50C-407E-A947-70E740481C1C}">
+                <a14:useLocalDpi xmlns:a14="http://schemas.microsoft.com/office/drawing/2010/main" val="0"/>
+              </a:ext>
+            </a:extLst>
+          </a:blip>
+          <a:stretch>
+            <a:fillRect/>
+          </a:stretch>
+        </p:blipFill>
+        <p:spPr>
+          <a:xfrm>
+            <a:off x="9840416" y="6021288"/>
+            <a:ext cx="2135560" cy="650262"/>
+          </a:xfrm>
+          <a:prstGeom prst="rect">
+            <a:avLst/>
+          </a:prstGeom>
+        </p:spPr>
+      </p:pic>
     </p:spTree>
   </p:cSld>
   <p:clrMap bg1="lt1" tx1="dk1" bg2="lt2" tx2="dk2" accent1="accent1" accent2="accent2" accent3="accent3" accent4="accent4" accent5="accent5" accent6="accent6" hlink="hlink" folHlink="folHlink"/>
@@ -5812,7 +5872,7 @@
           <a:solidFill>
             <a:schemeClr val="accent1"/>
           </a:solidFill>
-          <a:latin typeface="+mj-lt"/>
+          <a:latin typeface="Rubik Medium"/>
           <a:ea typeface="+mj-ea"/>
           <a:cs typeface="+mj-cs"/>
         </a:defRPr>
@@ -6239,17 +6299,29 @@
           <a:p>
             <a:pPr algn="ctr"/>
             <a:r>
-              <a:rPr lang="en-GB" dirty="0" smtClean="0"/>
+              <a:rPr lang="en-GB" dirty="0" smtClean="0">
+                <a:latin typeface="Rubik Medium"/>
+                <a:cs typeface="Rubik Medium"/>
+              </a:rPr>
               <a:t> PEPFAR use case:</a:t>
             </a:r>
             <a:br>
-              <a:rPr lang="en-GB" dirty="0" smtClean="0"/>
+              <a:rPr lang="en-GB" dirty="0" smtClean="0">
+                <a:latin typeface="Rubik Medium"/>
+                <a:cs typeface="Rubik Medium"/>
+              </a:rPr>
             </a:br>
             <a:r>
-              <a:rPr lang="en-GB" dirty="0" smtClean="0"/>
+              <a:rPr lang="en-GB" dirty="0" smtClean="0">
+                <a:latin typeface="Rubik Medium"/>
+                <a:cs typeface="Rubik Medium"/>
+              </a:rPr>
               <a:t>Complex data modelling</a:t>
             </a:r>
-            <a:endParaRPr lang="x-none" altLang="en-GB" dirty="0" smtClean="0"/>
+            <a:endParaRPr lang="x-none" altLang="en-GB" dirty="0" smtClean="0">
+              <a:latin typeface="Rubik Medium"/>
+              <a:cs typeface="Rubik Medium"/>
+            </a:endParaRPr>
           </a:p>
         </p:txBody>
       </p:sp>
@@ -6282,7 +6354,7 @@
                   <a:schemeClr val="tx1"/>
                 </a:solidFill>
               </a:rPr>
-              <a:t>DHIS 2 Experts Academy</a:t>
+              <a:t>DHIS2 Annual Conference</a:t>
             </a:r>
           </a:p>
           <a:p>
@@ -6293,7 +6365,7 @@
                   <a:schemeClr val="tx1"/>
                 </a:solidFill>
               </a:rPr>
-              <a:t>June 18, 2018</a:t>
+              <a:t>June 19, 2019</a:t>
             </a:r>
           </a:p>
           <a:p>
@@ -6301,30 +6373,6 @@
           </a:p>
         </p:txBody>
       </p:sp>
-      <p:pic>
-        <p:nvPicPr>
-          <p:cNvPr id="4" name="Picture 3"/>
-          <p:cNvPicPr>
-            <a:picLocks noChangeAspect="1"/>
-          </p:cNvPicPr>
-          <p:nvPr/>
-        </p:nvPicPr>
-        <p:blipFill>
-          <a:blip r:embed="rId2"/>
-          <a:stretch>
-            <a:fillRect/>
-          </a:stretch>
-        </p:blipFill>
-        <p:spPr>
-          <a:xfrm>
-            <a:off x="10135573" y="5550807"/>
-            <a:ext cx="2056427" cy="885217"/>
-          </a:xfrm>
-          <a:prstGeom prst="rect">
-            <a:avLst/>
-          </a:prstGeom>
-        </p:spPr>
-      </p:pic>
     </p:spTree>
   </p:cSld>
   <p:clrMapOvr>
@@ -6367,7 +6415,7 @@
         </p:nvSpPr>
         <p:spPr>
           <a:xfrm>
-            <a:off x="263352" y="1556792"/>
+            <a:off x="263352" y="1700808"/>
             <a:ext cx="9289032" cy="3672408"/>
           </a:xfrm>
           <a:prstGeom prst="rect">
@@ -6453,31 +6501,60 @@
           <a:p>
             <a:pPr algn="ctr"/>
             <a:r>
-              <a:rPr lang="en-US" altLang="en-US" sz="3200" i="1" dirty="0">
+              <a:rPr lang="en-US" altLang="en-US" sz="2900" i="1" dirty="0">
                 <a:solidFill>
                   <a:schemeClr val="tx1"/>
                 </a:solidFill>
               </a:rPr>
-              <a:t>data set dimensions: Attribute </a:t>
-            </a:r>
-            <a:r>
-              <a:rPr lang="en-US" altLang="en-US" sz="3200" i="1" dirty="0" smtClean="0">
+              <a:t>data </a:t>
+            </a:r>
+            <a:r>
+              <a:rPr lang="en-US" altLang="en-US" sz="2900" i="1" dirty="0" smtClean="0">
                 <a:solidFill>
                   <a:schemeClr val="tx1"/>
                 </a:solidFill>
               </a:rPr>
-              <a:t>Options</a:t>
-            </a:r>
+              <a:t>set dimensions</a:t>
+            </a:r>
+            <a:r>
+              <a:rPr lang="en-US" altLang="en-US" sz="2900" i="1" dirty="0">
+                <a:solidFill>
+                  <a:schemeClr val="tx1"/>
+                </a:solidFill>
+              </a:rPr>
+              <a:t>: </a:t>
+            </a:r>
+            <a:r>
+              <a:rPr lang="en-US" altLang="en-US" sz="2900" i="1" dirty="0" smtClean="0">
+                <a:solidFill>
+                  <a:schemeClr val="tx1"/>
+                </a:solidFill>
+              </a:rPr>
+              <a:t>attribute categories</a:t>
+            </a:r>
+            <a:endParaRPr lang="en-US" altLang="en-US" sz="2900" i="1" dirty="0">
+              <a:solidFill>
+                <a:schemeClr val="tx1"/>
+              </a:solidFill>
+            </a:endParaRPr>
           </a:p>
           <a:p>
             <a:pPr algn="ctr"/>
             <a:r>
+              <a:rPr lang="en-US" altLang="en-US" sz="2400" i="1" dirty="0" smtClean="0">
+                <a:solidFill>
+                  <a:schemeClr val="tx1"/>
+                </a:solidFill>
+              </a:rPr>
+              <a:t>(</a:t>
+            </a:r>
+            <a:r>
               <a:rPr lang="en-US" altLang="en-US" sz="2400" i="1" dirty="0">
                 <a:solidFill>
                   <a:schemeClr val="tx1"/>
                 </a:solidFill>
               </a:rPr>
-              <a:t>(extra dimensions: projects, partners, accounts, etc.)</a:t>
+              <a:t>extra dimensions: projects, partners, accounts, etc.)</a:t>
             </a:r>
             <a:endParaRPr lang="x-none" altLang="en-US" sz="2400" i="1" dirty="0">
               <a:solidFill>
@@ -6496,7 +6573,7 @@
           <a:p>
             <a:pPr algn="ctr"/>
             <a:r>
-              <a:rPr lang="en-US" altLang="en-US" sz="3200" i="1" dirty="0" smtClean="0">
+              <a:rPr lang="en-US" altLang="en-US" sz="4000" i="1" dirty="0" smtClean="0">
                 <a:solidFill>
                   <a:schemeClr val="tx1"/>
                 </a:solidFill>
@@ -6515,63 +6592,31 @@
           <a:p>
             <a:pPr algn="ctr"/>
             <a:r>
-              <a:rPr lang="en-US" altLang="en-US" sz="3200" i="1" dirty="0">
+              <a:rPr lang="en-US" altLang="en-US" sz="2900" i="1" dirty="0">
                 <a:solidFill>
                   <a:schemeClr val="tx1"/>
                 </a:solidFill>
               </a:rPr>
-              <a:t>d</a:t>
-            </a:r>
-            <a:r>
-              <a:rPr lang="en-US" altLang="en-US" sz="3200" i="1" dirty="0" smtClean="0">
+              <a:t>data element dimensions: disaggregation categories</a:t>
+            </a:r>
+          </a:p>
+          <a:p>
+            <a:pPr algn="ctr"/>
+            <a:r>
+              <a:rPr lang="en-US" altLang="en-US" sz="2400" i="1" dirty="0" smtClean="0">
                 <a:solidFill>
                   <a:schemeClr val="tx1"/>
                 </a:solidFill>
               </a:rPr>
-              <a:t>ata </a:t>
-            </a:r>
-            <a:r>
-              <a:rPr lang="en-US" altLang="en-US" sz="3200" i="1" dirty="0">
+              <a:t> </a:t>
+            </a:r>
+            <a:r>
+              <a:rPr lang="en-US" altLang="en-US" sz="2400" i="1" dirty="0">
                 <a:solidFill>
                   <a:schemeClr val="tx1"/>
                 </a:solidFill>
               </a:rPr>
-              <a:t>e</a:t>
-            </a:r>
-            <a:r>
-              <a:rPr lang="en-US" altLang="en-US" sz="3200" i="1" dirty="0" smtClean="0">
-                <a:solidFill>
-                  <a:schemeClr val="tx1"/>
-                </a:solidFill>
-              </a:rPr>
-              <a:t>lement </a:t>
-            </a:r>
-            <a:r>
-              <a:rPr lang="en-US" altLang="en-US" sz="3200" i="1" dirty="0">
-                <a:solidFill>
-                  <a:schemeClr val="tx1"/>
-                </a:solidFill>
-              </a:rPr>
-              <a:t>dimensions: Category </a:t>
-            </a:r>
-            <a:r>
-              <a:rPr lang="en-US" altLang="en-US" sz="3200" i="1" dirty="0" smtClean="0">
-                <a:solidFill>
-                  <a:schemeClr val="tx1"/>
-                </a:solidFill>
-              </a:rPr>
-              <a:t>Options</a:t>
-            </a:r>
-          </a:p>
-          <a:p>
-            <a:pPr algn="ctr"/>
-            <a:r>
-              <a:rPr lang="en-US" altLang="en-US" sz="2400" i="1" dirty="0">
-                <a:solidFill>
-                  <a:schemeClr val="tx1"/>
-                </a:solidFill>
-              </a:rPr>
-              <a:t> (disaggregations: age, sex, test result, etc.</a:t>
+              <a:t>(disaggregations: age, sex, test result, etc.</a:t>
             </a:r>
             <a:r>
               <a:rPr lang="en-US" altLang="en-US" sz="2400" i="1" dirty="0" smtClean="0">
@@ -7519,7 +7564,7 @@
       </p:cxnSp>
       <p:sp>
         <p:nvSpPr>
-          <p:cNvPr id="28" name="Title 1"/>
+          <p:cNvPr id="29" name="Title 1"/>
           <p:cNvSpPr txBox="1">
             <a:spLocks/>
           </p:cNvSpPr>
@@ -7527,8 +7572,8 @@
         </p:nvSpPr>
         <p:spPr>
           <a:xfrm>
-            <a:off x="767408" y="5877272"/>
-            <a:ext cx="8314266" cy="719656"/>
+            <a:off x="4943872" y="1917256"/>
+            <a:ext cx="4824536" cy="503632"/>
           </a:xfrm>
           <a:prstGeom prst="rect">
             <a:avLst/>
@@ -7613,46 +7658,14 @@
           <a:p>
             <a:pPr algn="ctr"/>
             <a:r>
-              <a:rPr lang="en-US" altLang="en-US" sz="2400" i="1" dirty="0">
+              <a:rPr lang="en-US" altLang="en-US" sz="2000" i="1" dirty="0" smtClean="0">
                 <a:solidFill>
                   <a:schemeClr val="tx1"/>
                 </a:solidFill>
               </a:rPr>
-              <a:t>d</a:t>
-            </a:r>
-            <a:r>
-              <a:rPr lang="en-US" altLang="en-US" sz="2400" i="1" dirty="0" smtClean="0">
-                <a:solidFill>
-                  <a:schemeClr val="tx1"/>
-                </a:solidFill>
-              </a:rPr>
-              <a:t>ata </a:t>
-            </a:r>
-            <a:r>
-              <a:rPr lang="en-US" altLang="en-US" sz="2400" i="1" dirty="0">
-                <a:solidFill>
-                  <a:schemeClr val="tx1"/>
-                </a:solidFill>
-              </a:rPr>
-              <a:t>e</a:t>
-            </a:r>
-            <a:r>
-              <a:rPr lang="en-US" altLang="en-US" sz="2400" i="1" dirty="0" smtClean="0">
-                <a:solidFill>
-                  <a:schemeClr val="tx1"/>
-                </a:solidFill>
-              </a:rPr>
-              <a:t>lement </a:t>
-            </a:r>
-            <a:r>
-              <a:rPr lang="en-US" altLang="en-US" sz="2400" i="1" dirty="0">
-                <a:solidFill>
-                  <a:schemeClr val="tx1"/>
-                </a:solidFill>
-              </a:rPr>
-              <a:t>dimensions: Category Options</a:t>
-            </a:r>
-            <a:endParaRPr lang="x-none" altLang="en-US" sz="2400" i="1" dirty="0">
+              <a:t>(PEPFAR DATIM)</a:t>
+            </a:r>
+            <a:endParaRPr lang="x-none" altLang="en-US" sz="2000" i="1" dirty="0">
               <a:solidFill>
                 <a:schemeClr val="tx1"/>
               </a:solidFill>
@@ -7662,7 +7675,7 @@
       </p:sp>
       <p:sp>
         <p:nvSpPr>
-          <p:cNvPr id="29" name="Title 1"/>
+          <p:cNvPr id="41" name="Title 1"/>
           <p:cNvSpPr txBox="1">
             <a:spLocks/>
           </p:cNvSpPr>
@@ -7670,8 +7683,8 @@
         </p:nvSpPr>
         <p:spPr>
           <a:xfrm>
-            <a:off x="4943872" y="1917256"/>
-            <a:ext cx="4824536" cy="503632"/>
+            <a:off x="191344" y="5877272"/>
+            <a:ext cx="8314266" cy="719656"/>
           </a:xfrm>
           <a:prstGeom prst="rect">
             <a:avLst/>
@@ -7756,14 +7769,70 @@
           <a:p>
             <a:pPr algn="ctr"/>
             <a:r>
-              <a:rPr lang="en-US" altLang="en-US" sz="2000" i="1" dirty="0" smtClean="0">
+              <a:rPr lang="it-IT" altLang="en-US" sz="2400" i="1" dirty="0">
                 <a:solidFill>
                   <a:schemeClr val="tx1"/>
                 </a:solidFill>
               </a:rPr>
-              <a:t>(PEPFAR DATIM)</a:t>
-            </a:r>
-            <a:endParaRPr lang="x-none" altLang="en-US" sz="2000" i="1" dirty="0">
+              <a:t>data </a:t>
+            </a:r>
+            <a:r>
+              <a:rPr lang="it-IT" altLang="en-US" sz="2400" i="1" dirty="0" err="1">
+                <a:solidFill>
+                  <a:schemeClr val="tx1"/>
+                </a:solidFill>
+              </a:rPr>
+              <a:t>element</a:t>
+            </a:r>
+            <a:r>
+              <a:rPr lang="it-IT" altLang="en-US" sz="2400" i="1" dirty="0">
+                <a:solidFill>
+                  <a:schemeClr val="tx1"/>
+                </a:solidFill>
+              </a:rPr>
+              <a:t> </a:t>
+            </a:r>
+            <a:r>
+              <a:rPr lang="it-IT" altLang="en-US" sz="2400" i="1" dirty="0" err="1">
+                <a:solidFill>
+                  <a:schemeClr val="tx1"/>
+                </a:solidFill>
+              </a:rPr>
+              <a:t>dimensions</a:t>
+            </a:r>
+            <a:r>
+              <a:rPr lang="it-IT" altLang="en-US" sz="2400" i="1" dirty="0">
+                <a:solidFill>
+                  <a:schemeClr val="tx1"/>
+                </a:solidFill>
+              </a:rPr>
+              <a:t>: </a:t>
+            </a:r>
+            <a:r>
+              <a:rPr lang="it-IT" altLang="en-US" sz="2400" i="1" dirty="0" err="1">
+                <a:solidFill>
+                  <a:schemeClr val="tx1"/>
+                </a:solidFill>
+              </a:rPr>
+              <a:t>disaggregation</a:t>
+            </a:r>
+            <a:r>
+              <a:rPr lang="it-IT" altLang="en-US" sz="2400" i="1" dirty="0">
+                <a:solidFill>
+                  <a:schemeClr val="tx1"/>
+                </a:solidFill>
+              </a:rPr>
+              <a:t> </a:t>
+            </a:r>
+            <a:r>
+              <a:rPr lang="it-IT" altLang="en-US" sz="2400" i="1" dirty="0" err="1" smtClean="0">
+                <a:solidFill>
+                  <a:schemeClr val="tx1"/>
+                </a:solidFill>
+              </a:rPr>
+              <a:t>categories</a:t>
+            </a:r>
+            <a:endParaRPr lang="it-IT" altLang="en-US" sz="2400" i="1" dirty="0">
               <a:solidFill>
                 <a:schemeClr val="tx1"/>
               </a:solidFill>
@@ -8513,7 +8582,73 @@
       </p:cxnSp>
       <p:sp>
         <p:nvSpPr>
-          <p:cNvPr id="23" name="Title 1"/>
+          <p:cNvPr id="24" name="TextBox 23"/>
+          <p:cNvSpPr txBox="1"/>
+          <p:nvPr/>
+        </p:nvSpPr>
+        <p:spPr>
+          <a:xfrm>
+            <a:off x="7752184" y="3933056"/>
+            <a:ext cx="1872208" cy="369332"/>
+          </a:xfrm>
+          <a:prstGeom prst="rect">
+            <a:avLst/>
+          </a:prstGeom>
+          <a:noFill/>
+          <a:ln w="12700">
+            <a:noFill/>
+          </a:ln>
+        </p:spPr>
+        <p:txBody>
+          <a:bodyPr wrap="square" rtlCol="0">
+            <a:spAutoFit/>
+          </a:bodyPr>
+          <a:lstStyle/>
+          <a:p>
+            <a:r>
+              <a:rPr lang="en-US" dirty="0" smtClean="0"/>
+              <a:t>category option</a:t>
+            </a:r>
+            <a:endParaRPr lang="en-US" dirty="0"/>
+          </a:p>
+        </p:txBody>
+      </p:sp>
+      <p:sp>
+        <p:nvSpPr>
+          <p:cNvPr id="25" name="TextBox 24"/>
+          <p:cNvSpPr txBox="1"/>
+          <p:nvPr/>
+        </p:nvSpPr>
+        <p:spPr>
+          <a:xfrm>
+            <a:off x="7752184" y="2780928"/>
+            <a:ext cx="1337009" cy="369332"/>
+          </a:xfrm>
+          <a:prstGeom prst="rect">
+            <a:avLst/>
+          </a:prstGeom>
+          <a:noFill/>
+          <a:ln w="12700">
+            <a:noFill/>
+          </a:ln>
+        </p:spPr>
+        <p:txBody>
+          <a:bodyPr wrap="square" rtlCol="0">
+            <a:spAutoFit/>
+          </a:bodyPr>
+          <a:lstStyle/>
+          <a:p>
+            <a:r>
+              <a:rPr lang="en-US" dirty="0" smtClean="0"/>
+              <a:t>category</a:t>
+            </a:r>
+            <a:endParaRPr lang="en-US" dirty="0"/>
+          </a:p>
+        </p:txBody>
+      </p:sp>
+      <p:sp>
+        <p:nvSpPr>
+          <p:cNvPr id="26" name="Title 1"/>
           <p:cNvSpPr txBox="1">
             <a:spLocks/>
           </p:cNvSpPr>
@@ -8521,8 +8656,8 @@
         </p:nvSpPr>
         <p:spPr>
           <a:xfrm>
-            <a:off x="767408" y="5877696"/>
-            <a:ext cx="8314266" cy="719656"/>
+            <a:off x="4943872" y="1917256"/>
+            <a:ext cx="4824536" cy="503632"/>
           </a:xfrm>
           <a:prstGeom prst="rect">
             <a:avLst/>
@@ -8607,46 +8742,14 @@
           <a:p>
             <a:pPr algn="ctr"/>
             <a:r>
-              <a:rPr lang="en-US" altLang="en-US" sz="2400" i="1" dirty="0">
+              <a:rPr lang="en-US" altLang="en-US" sz="2000" i="1" dirty="0" smtClean="0">
                 <a:solidFill>
                   <a:schemeClr val="tx1"/>
                 </a:solidFill>
               </a:rPr>
-              <a:t>d</a:t>
-            </a:r>
-            <a:r>
-              <a:rPr lang="en-US" altLang="en-US" sz="2400" i="1" dirty="0" smtClean="0">
-                <a:solidFill>
-                  <a:schemeClr val="tx1"/>
-                </a:solidFill>
-              </a:rPr>
-              <a:t>ata </a:t>
-            </a:r>
-            <a:r>
-              <a:rPr lang="en-US" altLang="en-US" sz="2400" i="1" dirty="0">
-                <a:solidFill>
-                  <a:schemeClr val="tx1"/>
-                </a:solidFill>
-              </a:rPr>
-              <a:t>e</a:t>
-            </a:r>
-            <a:r>
-              <a:rPr lang="en-US" altLang="en-US" sz="2400" i="1" dirty="0" smtClean="0">
-                <a:solidFill>
-                  <a:schemeClr val="tx1"/>
-                </a:solidFill>
-              </a:rPr>
-              <a:t>lement </a:t>
-            </a:r>
-            <a:r>
-              <a:rPr lang="en-US" altLang="en-US" sz="2400" i="1" dirty="0">
-                <a:solidFill>
-                  <a:schemeClr val="tx1"/>
-                </a:solidFill>
-              </a:rPr>
-              <a:t>dimensions: Category Options</a:t>
-            </a:r>
-            <a:endParaRPr lang="x-none" altLang="en-US" sz="2400" i="1" dirty="0">
+              <a:t>(PEPFAR DATIM)</a:t>
+            </a:r>
+            <a:endParaRPr lang="x-none" altLang="en-US" sz="2000" i="1" dirty="0">
               <a:solidFill>
                 <a:schemeClr val="tx1"/>
               </a:solidFill>
@@ -8656,73 +8759,7 @@
       </p:sp>
       <p:sp>
         <p:nvSpPr>
-          <p:cNvPr id="24" name="TextBox 23"/>
-          <p:cNvSpPr txBox="1"/>
-          <p:nvPr/>
-        </p:nvSpPr>
-        <p:spPr>
-          <a:xfrm>
-            <a:off x="7752184" y="3933056"/>
-            <a:ext cx="1872208" cy="369332"/>
-          </a:xfrm>
-          <a:prstGeom prst="rect">
-            <a:avLst/>
-          </a:prstGeom>
-          <a:noFill/>
-          <a:ln w="12700">
-            <a:noFill/>
-          </a:ln>
-        </p:spPr>
-        <p:txBody>
-          <a:bodyPr wrap="square" rtlCol="0">
-            <a:spAutoFit/>
-          </a:bodyPr>
-          <a:lstStyle/>
-          <a:p>
-            <a:r>
-              <a:rPr lang="en-US" dirty="0" smtClean="0"/>
-              <a:t>category option</a:t>
-            </a:r>
-            <a:endParaRPr lang="en-US" dirty="0"/>
-          </a:p>
-        </p:txBody>
-      </p:sp>
-      <p:sp>
-        <p:nvSpPr>
-          <p:cNvPr id="25" name="TextBox 24"/>
-          <p:cNvSpPr txBox="1"/>
-          <p:nvPr/>
-        </p:nvSpPr>
-        <p:spPr>
-          <a:xfrm>
-            <a:off x="7752184" y="2780928"/>
-            <a:ext cx="1337009" cy="369332"/>
-          </a:xfrm>
-          <a:prstGeom prst="rect">
-            <a:avLst/>
-          </a:prstGeom>
-          <a:noFill/>
-          <a:ln w="12700">
-            <a:noFill/>
-          </a:ln>
-        </p:spPr>
-        <p:txBody>
-          <a:bodyPr wrap="square" rtlCol="0">
-            <a:spAutoFit/>
-          </a:bodyPr>
-          <a:lstStyle/>
-          <a:p>
-            <a:r>
-              <a:rPr lang="en-US" dirty="0" smtClean="0"/>
-              <a:t>category</a:t>
-            </a:r>
-            <a:endParaRPr lang="en-US" dirty="0"/>
-          </a:p>
-        </p:txBody>
-      </p:sp>
-      <p:sp>
-        <p:nvSpPr>
-          <p:cNvPr id="26" name="Title 1"/>
+          <p:cNvPr id="28" name="Title 1"/>
           <p:cNvSpPr txBox="1">
             <a:spLocks/>
           </p:cNvSpPr>
@@ -8730,8 +8767,8 @@
         </p:nvSpPr>
         <p:spPr>
           <a:xfrm>
-            <a:off x="4943872" y="1917256"/>
-            <a:ext cx="4824536" cy="503632"/>
+            <a:off x="191344" y="5877272"/>
+            <a:ext cx="8314266" cy="719656"/>
           </a:xfrm>
           <a:prstGeom prst="rect">
             <a:avLst/>
@@ -8816,14 +8853,70 @@
           <a:p>
             <a:pPr algn="ctr"/>
             <a:r>
-              <a:rPr lang="en-US" altLang="en-US" sz="2000" i="1" dirty="0" smtClean="0">
+              <a:rPr lang="it-IT" altLang="en-US" sz="2400" i="1" dirty="0">
                 <a:solidFill>
                   <a:schemeClr val="tx1"/>
                 </a:solidFill>
               </a:rPr>
-              <a:t>(PEPFAR DATIM)</a:t>
-            </a:r>
-            <a:endParaRPr lang="x-none" altLang="en-US" sz="2000" i="1" dirty="0">
+              <a:t>data </a:t>
+            </a:r>
+            <a:r>
+              <a:rPr lang="it-IT" altLang="en-US" sz="2400" i="1" dirty="0" err="1">
+                <a:solidFill>
+                  <a:schemeClr val="tx1"/>
+                </a:solidFill>
+              </a:rPr>
+              <a:t>element</a:t>
+            </a:r>
+            <a:r>
+              <a:rPr lang="it-IT" altLang="en-US" sz="2400" i="1" dirty="0">
+                <a:solidFill>
+                  <a:schemeClr val="tx1"/>
+                </a:solidFill>
+              </a:rPr>
+              <a:t> </a:t>
+            </a:r>
+            <a:r>
+              <a:rPr lang="it-IT" altLang="en-US" sz="2400" i="1" dirty="0" err="1">
+                <a:solidFill>
+                  <a:schemeClr val="tx1"/>
+                </a:solidFill>
+              </a:rPr>
+              <a:t>dimensions</a:t>
+            </a:r>
+            <a:r>
+              <a:rPr lang="it-IT" altLang="en-US" sz="2400" i="1" dirty="0">
+                <a:solidFill>
+                  <a:schemeClr val="tx1"/>
+                </a:solidFill>
+              </a:rPr>
+              <a:t>: </a:t>
+            </a:r>
+            <a:r>
+              <a:rPr lang="it-IT" altLang="en-US" sz="2400" i="1" dirty="0" err="1">
+                <a:solidFill>
+                  <a:schemeClr val="tx1"/>
+                </a:solidFill>
+              </a:rPr>
+              <a:t>disaggregation</a:t>
+            </a:r>
+            <a:r>
+              <a:rPr lang="it-IT" altLang="en-US" sz="2400" i="1" dirty="0">
+                <a:solidFill>
+                  <a:schemeClr val="tx1"/>
+                </a:solidFill>
+              </a:rPr>
+              <a:t> </a:t>
+            </a:r>
+            <a:r>
+              <a:rPr lang="it-IT" altLang="en-US" sz="2400" i="1" dirty="0" err="1" smtClean="0">
+                <a:solidFill>
+                  <a:schemeClr val="tx1"/>
+                </a:solidFill>
+              </a:rPr>
+              <a:t>categories</a:t>
+            </a:r>
+            <a:endParaRPr lang="it-IT" altLang="en-US" sz="2400" i="1" dirty="0">
               <a:solidFill>
                 <a:schemeClr val="tx1"/>
               </a:solidFill>
@@ -9622,7 +9715,7 @@
       </p:cxnSp>
       <p:sp>
         <p:nvSpPr>
-          <p:cNvPr id="23" name="Title 1"/>
+          <p:cNvPr id="24" name="Title 1"/>
           <p:cNvSpPr txBox="1">
             <a:spLocks/>
           </p:cNvSpPr>
@@ -9630,8 +9723,8 @@
         </p:nvSpPr>
         <p:spPr>
           <a:xfrm>
-            <a:off x="767408" y="5877696"/>
-            <a:ext cx="8314266" cy="719656"/>
+            <a:off x="4943872" y="1917256"/>
+            <a:ext cx="4824536" cy="503632"/>
           </a:xfrm>
           <a:prstGeom prst="rect">
             <a:avLst/>
@@ -9716,46 +9809,14 @@
           <a:p>
             <a:pPr algn="ctr"/>
             <a:r>
-              <a:rPr lang="en-US" altLang="en-US" sz="2400" i="1" dirty="0">
+              <a:rPr lang="en-US" altLang="en-US" sz="2000" i="1" dirty="0" smtClean="0">
                 <a:solidFill>
                   <a:schemeClr val="tx1"/>
                 </a:solidFill>
               </a:rPr>
-              <a:t>d</a:t>
-            </a:r>
-            <a:r>
-              <a:rPr lang="en-US" altLang="en-US" sz="2400" i="1" dirty="0" smtClean="0">
-                <a:solidFill>
-                  <a:schemeClr val="tx1"/>
-                </a:solidFill>
-              </a:rPr>
-              <a:t>ata </a:t>
-            </a:r>
-            <a:r>
-              <a:rPr lang="en-US" altLang="en-US" sz="2400" i="1" dirty="0">
-                <a:solidFill>
-                  <a:schemeClr val="tx1"/>
-                </a:solidFill>
-              </a:rPr>
-              <a:t>e</a:t>
-            </a:r>
-            <a:r>
-              <a:rPr lang="en-US" altLang="en-US" sz="2400" i="1" dirty="0" smtClean="0">
-                <a:solidFill>
-                  <a:schemeClr val="tx1"/>
-                </a:solidFill>
-              </a:rPr>
-              <a:t>lement </a:t>
-            </a:r>
-            <a:r>
-              <a:rPr lang="en-US" altLang="en-US" sz="2400" i="1" dirty="0">
-                <a:solidFill>
-                  <a:schemeClr val="tx1"/>
-                </a:solidFill>
-              </a:rPr>
-              <a:t>dimensions: Category Options</a:t>
-            </a:r>
-            <a:endParaRPr lang="x-none" altLang="en-US" sz="2400" i="1" dirty="0">
+              <a:t>(PEPFAR DATIM)</a:t>
+            </a:r>
+            <a:endParaRPr lang="x-none" altLang="en-US" sz="2000" i="1" dirty="0">
               <a:solidFill>
                 <a:schemeClr val="tx1"/>
               </a:solidFill>
@@ -9765,7 +9826,7 @@
       </p:sp>
       <p:sp>
         <p:nvSpPr>
-          <p:cNvPr id="24" name="Title 1"/>
+          <p:cNvPr id="25" name="Title 1"/>
           <p:cNvSpPr txBox="1">
             <a:spLocks/>
           </p:cNvSpPr>
@@ -9773,8 +9834,8 @@
         </p:nvSpPr>
         <p:spPr>
           <a:xfrm>
-            <a:off x="4943872" y="1917256"/>
-            <a:ext cx="4824536" cy="503632"/>
+            <a:off x="191344" y="5877272"/>
+            <a:ext cx="8314266" cy="719656"/>
           </a:xfrm>
           <a:prstGeom prst="rect">
             <a:avLst/>
@@ -9859,14 +9920,70 @@
           <a:p>
             <a:pPr algn="ctr"/>
             <a:r>
-              <a:rPr lang="en-US" altLang="en-US" sz="2000" i="1" dirty="0" smtClean="0">
+              <a:rPr lang="it-IT" altLang="en-US" sz="2400" i="1" dirty="0">
                 <a:solidFill>
                   <a:schemeClr val="tx1"/>
                 </a:solidFill>
               </a:rPr>
-              <a:t>(PEPFAR DATIM)</a:t>
-            </a:r>
-            <a:endParaRPr lang="x-none" altLang="en-US" sz="2000" i="1" dirty="0">
+              <a:t>data </a:t>
+            </a:r>
+            <a:r>
+              <a:rPr lang="it-IT" altLang="en-US" sz="2400" i="1" dirty="0" err="1">
+                <a:solidFill>
+                  <a:schemeClr val="tx1"/>
+                </a:solidFill>
+              </a:rPr>
+              <a:t>element</a:t>
+            </a:r>
+            <a:r>
+              <a:rPr lang="it-IT" altLang="en-US" sz="2400" i="1" dirty="0">
+                <a:solidFill>
+                  <a:schemeClr val="tx1"/>
+                </a:solidFill>
+              </a:rPr>
+              <a:t> </a:t>
+            </a:r>
+            <a:r>
+              <a:rPr lang="it-IT" altLang="en-US" sz="2400" i="1" dirty="0" err="1">
+                <a:solidFill>
+                  <a:schemeClr val="tx1"/>
+                </a:solidFill>
+              </a:rPr>
+              <a:t>dimensions</a:t>
+            </a:r>
+            <a:r>
+              <a:rPr lang="it-IT" altLang="en-US" sz="2400" i="1" dirty="0">
+                <a:solidFill>
+                  <a:schemeClr val="tx1"/>
+                </a:solidFill>
+              </a:rPr>
+              <a:t>: </a:t>
+            </a:r>
+            <a:r>
+              <a:rPr lang="it-IT" altLang="en-US" sz="2400" i="1" dirty="0" err="1">
+                <a:solidFill>
+                  <a:schemeClr val="tx1"/>
+                </a:solidFill>
+              </a:rPr>
+              <a:t>disaggregation</a:t>
+            </a:r>
+            <a:r>
+              <a:rPr lang="it-IT" altLang="en-US" sz="2400" i="1" dirty="0">
+                <a:solidFill>
+                  <a:schemeClr val="tx1"/>
+                </a:solidFill>
+              </a:rPr>
+              <a:t> </a:t>
+            </a:r>
+            <a:r>
+              <a:rPr lang="it-IT" altLang="en-US" sz="2400" i="1" dirty="0" err="1" smtClean="0">
+                <a:solidFill>
+                  <a:schemeClr val="tx1"/>
+                </a:solidFill>
+              </a:rPr>
+              <a:t>categories</a:t>
+            </a:r>
+            <a:endParaRPr lang="it-IT" altLang="en-US" sz="2400" i="1" dirty="0">
               <a:solidFill>
                 <a:schemeClr val="tx1"/>
               </a:solidFill>
@@ -10543,7 +10660,177 @@
       </p:sp>
       <p:sp>
         <p:nvSpPr>
-          <p:cNvPr id="24" name="Title 1"/>
+          <p:cNvPr id="25" name="TextBox 24"/>
+          <p:cNvSpPr txBox="1"/>
+          <p:nvPr/>
+        </p:nvSpPr>
+        <p:spPr>
+          <a:xfrm>
+            <a:off x="7752184" y="3933056"/>
+            <a:ext cx="1872208" cy="369332"/>
+          </a:xfrm>
+          <a:prstGeom prst="rect">
+            <a:avLst/>
+          </a:prstGeom>
+          <a:noFill/>
+          <a:ln w="12700">
+            <a:noFill/>
+          </a:ln>
+        </p:spPr>
+        <p:txBody>
+          <a:bodyPr wrap="square" rtlCol="0">
+            <a:spAutoFit/>
+          </a:bodyPr>
+          <a:lstStyle/>
+          <a:p>
+            <a:r>
+              <a:rPr lang="en-US" dirty="0" smtClean="0"/>
+              <a:t>category option</a:t>
+            </a:r>
+            <a:endParaRPr lang="en-US" dirty="0"/>
+          </a:p>
+        </p:txBody>
+      </p:sp>
+      <p:sp>
+        <p:nvSpPr>
+          <p:cNvPr id="26" name="TextBox 25"/>
+          <p:cNvSpPr txBox="1"/>
+          <p:nvPr/>
+        </p:nvSpPr>
+        <p:spPr>
+          <a:xfrm>
+            <a:off x="7752184" y="2780928"/>
+            <a:ext cx="1337009" cy="369332"/>
+          </a:xfrm>
+          <a:prstGeom prst="rect">
+            <a:avLst/>
+          </a:prstGeom>
+          <a:noFill/>
+          <a:ln w="12700">
+            <a:noFill/>
+          </a:ln>
+        </p:spPr>
+        <p:txBody>
+          <a:bodyPr wrap="square" rtlCol="0">
+            <a:spAutoFit/>
+          </a:bodyPr>
+          <a:lstStyle/>
+          <a:p>
+            <a:r>
+              <a:rPr lang="en-US" dirty="0" smtClean="0"/>
+              <a:t>category</a:t>
+            </a:r>
+            <a:endParaRPr lang="en-US" dirty="0"/>
+          </a:p>
+        </p:txBody>
+      </p:sp>
+      <p:sp>
+        <p:nvSpPr>
+          <p:cNvPr id="28" name="TextBox 27"/>
+          <p:cNvSpPr txBox="1"/>
+          <p:nvPr/>
+        </p:nvSpPr>
+        <p:spPr>
+          <a:xfrm>
+            <a:off x="5159896" y="3933056"/>
+            <a:ext cx="2592288" cy="369332"/>
+          </a:xfrm>
+          <a:prstGeom prst="rect">
+            <a:avLst/>
+          </a:prstGeom>
+          <a:noFill/>
+          <a:ln w="12700">
+            <a:solidFill>
+              <a:schemeClr val="tx1"/>
+            </a:solidFill>
+          </a:ln>
+        </p:spPr>
+        <p:txBody>
+          <a:bodyPr wrap="square" rtlCol="0">
+            <a:spAutoFit/>
+          </a:bodyPr>
+          <a:lstStyle/>
+          <a:p>
+            <a:pPr algn="ctr"/>
+            <a:r>
+              <a:rPr lang="en-US" dirty="0"/>
+              <a:t>default</a:t>
+            </a:r>
+          </a:p>
+        </p:txBody>
+      </p:sp>
+      <p:sp>
+        <p:nvSpPr>
+          <p:cNvPr id="29" name="TextBox 28"/>
+          <p:cNvSpPr txBox="1"/>
+          <p:nvPr/>
+        </p:nvSpPr>
+        <p:spPr>
+          <a:xfrm>
+            <a:off x="5159896" y="2780928"/>
+            <a:ext cx="2592288" cy="369332"/>
+          </a:xfrm>
+          <a:prstGeom prst="rect">
+            <a:avLst/>
+          </a:prstGeom>
+          <a:noFill/>
+          <a:ln w="12700">
+            <a:solidFill>
+              <a:schemeClr val="tx1"/>
+            </a:solidFill>
+          </a:ln>
+        </p:spPr>
+        <p:txBody>
+          <a:bodyPr wrap="square" rtlCol="0">
+            <a:spAutoFit/>
+          </a:bodyPr>
+          <a:lstStyle/>
+          <a:p>
+            <a:pPr algn="ctr"/>
+            <a:r>
+              <a:rPr lang="en-US" dirty="0"/>
+              <a:t>default</a:t>
+            </a:r>
+          </a:p>
+        </p:txBody>
+      </p:sp>
+      <p:cxnSp>
+        <p:nvCxnSpPr>
+          <p:cNvPr id="36" name="Straight Arrow Connector 35"/>
+          <p:cNvCxnSpPr/>
+          <p:nvPr/>
+        </p:nvCxnSpPr>
+        <p:spPr>
+          <a:xfrm flipV="1">
+            <a:off x="6456040" y="3284984"/>
+            <a:ext cx="0" cy="504056"/>
+          </a:xfrm>
+          <a:prstGeom prst="straightConnector1">
+            <a:avLst/>
+          </a:prstGeom>
+          <a:ln>
+            <a:prstDash val="sysDash"/>
+            <a:tailEnd type="arrow"/>
+          </a:ln>
+        </p:spPr>
+        <p:style>
+          <a:lnRef idx="2">
+            <a:schemeClr val="accent1"/>
+          </a:lnRef>
+          <a:fillRef idx="0">
+            <a:schemeClr val="accent1"/>
+          </a:fillRef>
+          <a:effectRef idx="1">
+            <a:schemeClr val="accent1"/>
+          </a:effectRef>
+          <a:fontRef idx="minor">
+            <a:schemeClr val="tx1"/>
+          </a:fontRef>
+        </p:style>
+      </p:cxnSp>
+      <p:sp>
+        <p:nvSpPr>
+          <p:cNvPr id="40" name="Title 1"/>
           <p:cNvSpPr txBox="1">
             <a:spLocks/>
           </p:cNvSpPr>
@@ -10551,8 +10838,8 @@
         </p:nvSpPr>
         <p:spPr>
           <a:xfrm>
-            <a:off x="767408" y="5877696"/>
-            <a:ext cx="8314266" cy="719656"/>
+            <a:off x="4943872" y="1917256"/>
+            <a:ext cx="4824536" cy="503632"/>
           </a:xfrm>
           <a:prstGeom prst="rect">
             <a:avLst/>
@@ -10637,38 +10924,14 @@
           <a:p>
             <a:pPr algn="ctr"/>
             <a:r>
-              <a:rPr lang="en-US" altLang="en-US" sz="2400" i="1" dirty="0">
+              <a:rPr lang="en-US" altLang="en-US" sz="2000" i="1" dirty="0" smtClean="0">
                 <a:solidFill>
                   <a:schemeClr val="tx1"/>
                 </a:solidFill>
               </a:rPr>
-              <a:t>d</a:t>
-            </a:r>
-            <a:r>
-              <a:rPr lang="en-US" altLang="en-US" sz="2400" i="1" dirty="0" smtClean="0">
-                <a:solidFill>
-                  <a:schemeClr val="tx1"/>
-                </a:solidFill>
-              </a:rPr>
-              <a:t>ata </a:t>
-            </a:r>
-            <a:r>
-              <a:rPr lang="en-US" altLang="en-US" sz="2400" i="1" dirty="0">
-                <a:solidFill>
-                  <a:schemeClr val="tx1"/>
-                </a:solidFill>
-              </a:rPr>
-              <a:t>s</a:t>
-            </a:r>
-            <a:r>
-              <a:rPr lang="en-US" altLang="en-US" sz="2400" i="1" dirty="0" smtClean="0">
-                <a:solidFill>
-                  <a:schemeClr val="tx1"/>
-                </a:solidFill>
-              </a:rPr>
-              <a:t>et dimensions: Attribute Options</a:t>
-            </a:r>
-            <a:endParaRPr lang="x-none" altLang="en-US" sz="2400" i="1" dirty="0" smtClean="0">
+              <a:t>(PEPFAR DATIM)</a:t>
+            </a:r>
+            <a:endParaRPr lang="x-none" altLang="en-US" sz="2000" i="1" dirty="0">
               <a:solidFill>
                 <a:schemeClr val="tx1"/>
               </a:solidFill>
@@ -10678,177 +10941,7 @@
       </p:sp>
       <p:sp>
         <p:nvSpPr>
-          <p:cNvPr id="25" name="TextBox 24"/>
-          <p:cNvSpPr txBox="1"/>
-          <p:nvPr/>
-        </p:nvSpPr>
-        <p:spPr>
-          <a:xfrm>
-            <a:off x="7752184" y="3933056"/>
-            <a:ext cx="1872208" cy="369332"/>
-          </a:xfrm>
-          <a:prstGeom prst="rect">
-            <a:avLst/>
-          </a:prstGeom>
-          <a:noFill/>
-          <a:ln w="12700">
-            <a:noFill/>
-          </a:ln>
-        </p:spPr>
-        <p:txBody>
-          <a:bodyPr wrap="square" rtlCol="0">
-            <a:spAutoFit/>
-          </a:bodyPr>
-          <a:lstStyle/>
-          <a:p>
-            <a:r>
-              <a:rPr lang="en-US" dirty="0" smtClean="0"/>
-              <a:t>category option</a:t>
-            </a:r>
-            <a:endParaRPr lang="en-US" dirty="0"/>
-          </a:p>
-        </p:txBody>
-      </p:sp>
-      <p:sp>
-        <p:nvSpPr>
-          <p:cNvPr id="26" name="TextBox 25"/>
-          <p:cNvSpPr txBox="1"/>
-          <p:nvPr/>
-        </p:nvSpPr>
-        <p:spPr>
-          <a:xfrm>
-            <a:off x="7752184" y="2780928"/>
-            <a:ext cx="1337009" cy="369332"/>
-          </a:xfrm>
-          <a:prstGeom prst="rect">
-            <a:avLst/>
-          </a:prstGeom>
-          <a:noFill/>
-          <a:ln w="12700">
-            <a:noFill/>
-          </a:ln>
-        </p:spPr>
-        <p:txBody>
-          <a:bodyPr wrap="square" rtlCol="0">
-            <a:spAutoFit/>
-          </a:bodyPr>
-          <a:lstStyle/>
-          <a:p>
-            <a:r>
-              <a:rPr lang="en-US" dirty="0" smtClean="0"/>
-              <a:t>category</a:t>
-            </a:r>
-            <a:endParaRPr lang="en-US" dirty="0"/>
-          </a:p>
-        </p:txBody>
-      </p:sp>
-      <p:sp>
-        <p:nvSpPr>
-          <p:cNvPr id="28" name="TextBox 27"/>
-          <p:cNvSpPr txBox="1"/>
-          <p:nvPr/>
-        </p:nvSpPr>
-        <p:spPr>
-          <a:xfrm>
-            <a:off x="5159896" y="3933056"/>
-            <a:ext cx="2592288" cy="369332"/>
-          </a:xfrm>
-          <a:prstGeom prst="rect">
-            <a:avLst/>
-          </a:prstGeom>
-          <a:noFill/>
-          <a:ln w="12700">
-            <a:solidFill>
-              <a:schemeClr val="tx1"/>
-            </a:solidFill>
-          </a:ln>
-        </p:spPr>
-        <p:txBody>
-          <a:bodyPr wrap="square" rtlCol="0">
-            <a:spAutoFit/>
-          </a:bodyPr>
-          <a:lstStyle/>
-          <a:p>
-            <a:pPr algn="ctr"/>
-            <a:r>
-              <a:rPr lang="en-US" dirty="0"/>
-              <a:t>default</a:t>
-            </a:r>
-          </a:p>
-        </p:txBody>
-      </p:sp>
-      <p:sp>
-        <p:nvSpPr>
-          <p:cNvPr id="29" name="TextBox 28"/>
-          <p:cNvSpPr txBox="1"/>
-          <p:nvPr/>
-        </p:nvSpPr>
-        <p:spPr>
-          <a:xfrm>
-            <a:off x="5159896" y="2780928"/>
-            <a:ext cx="2592288" cy="369332"/>
-          </a:xfrm>
-          <a:prstGeom prst="rect">
-            <a:avLst/>
-          </a:prstGeom>
-          <a:noFill/>
-          <a:ln w="12700">
-            <a:solidFill>
-              <a:schemeClr val="tx1"/>
-            </a:solidFill>
-          </a:ln>
-        </p:spPr>
-        <p:txBody>
-          <a:bodyPr wrap="square" rtlCol="0">
-            <a:spAutoFit/>
-          </a:bodyPr>
-          <a:lstStyle/>
-          <a:p>
-            <a:pPr algn="ctr"/>
-            <a:r>
-              <a:rPr lang="en-US" dirty="0"/>
-              <a:t>default</a:t>
-            </a:r>
-          </a:p>
-        </p:txBody>
-      </p:sp>
-      <p:cxnSp>
-        <p:nvCxnSpPr>
-          <p:cNvPr id="36" name="Straight Arrow Connector 35"/>
-          <p:cNvCxnSpPr/>
-          <p:nvPr/>
-        </p:nvCxnSpPr>
-        <p:spPr>
-          <a:xfrm flipV="1">
-            <a:off x="6456040" y="3284984"/>
-            <a:ext cx="0" cy="504056"/>
-          </a:xfrm>
-          <a:prstGeom prst="straightConnector1">
-            <a:avLst/>
-          </a:prstGeom>
-          <a:ln>
-            <a:prstDash val="sysDash"/>
-            <a:tailEnd type="arrow"/>
-          </a:ln>
-        </p:spPr>
-        <p:style>
-          <a:lnRef idx="2">
-            <a:schemeClr val="accent1"/>
-          </a:lnRef>
-          <a:fillRef idx="0">
-            <a:schemeClr val="accent1"/>
-          </a:fillRef>
-          <a:effectRef idx="1">
-            <a:schemeClr val="accent1"/>
-          </a:effectRef>
-          <a:fontRef idx="minor">
-            <a:schemeClr val="tx1"/>
-          </a:fontRef>
-        </p:style>
-      </p:cxnSp>
-      <p:sp>
-        <p:nvSpPr>
-          <p:cNvPr id="40" name="Title 1"/>
+          <p:cNvPr id="33" name="Title 1"/>
           <p:cNvSpPr txBox="1">
             <a:spLocks/>
           </p:cNvSpPr>
@@ -10856,8 +10949,8 @@
         </p:nvSpPr>
         <p:spPr>
           <a:xfrm>
-            <a:off x="4943872" y="1917256"/>
-            <a:ext cx="4824536" cy="503632"/>
+            <a:off x="191344" y="5877696"/>
+            <a:ext cx="8314266" cy="719656"/>
           </a:xfrm>
           <a:prstGeom prst="rect">
             <a:avLst/>
@@ -10942,14 +11035,70 @@
           <a:p>
             <a:pPr algn="ctr"/>
             <a:r>
-              <a:rPr lang="en-US" altLang="en-US" sz="2000" i="1" dirty="0" smtClean="0">
+              <a:rPr lang="it-IT" altLang="en-US" sz="2400" i="1" dirty="0">
                 <a:solidFill>
                   <a:schemeClr val="tx1"/>
                 </a:solidFill>
               </a:rPr>
-              <a:t>(PEPFAR DATIM)</a:t>
-            </a:r>
-            <a:endParaRPr lang="x-none" altLang="en-US" sz="2000" i="1" dirty="0">
+              <a:t>data </a:t>
+            </a:r>
+            <a:r>
+              <a:rPr lang="it-IT" altLang="en-US" sz="2400" i="1" dirty="0" err="1">
+                <a:solidFill>
+                  <a:schemeClr val="tx1"/>
+                </a:solidFill>
+              </a:rPr>
+              <a:t>element</a:t>
+            </a:r>
+            <a:r>
+              <a:rPr lang="it-IT" altLang="en-US" sz="2400" i="1" dirty="0">
+                <a:solidFill>
+                  <a:schemeClr val="tx1"/>
+                </a:solidFill>
+              </a:rPr>
+              <a:t> </a:t>
+            </a:r>
+            <a:r>
+              <a:rPr lang="it-IT" altLang="en-US" sz="2400" i="1" dirty="0" err="1">
+                <a:solidFill>
+                  <a:schemeClr val="tx1"/>
+                </a:solidFill>
+              </a:rPr>
+              <a:t>dimensions</a:t>
+            </a:r>
+            <a:r>
+              <a:rPr lang="it-IT" altLang="en-US" sz="2400" i="1" dirty="0">
+                <a:solidFill>
+                  <a:schemeClr val="tx1"/>
+                </a:solidFill>
+              </a:rPr>
+              <a:t>: </a:t>
+            </a:r>
+            <a:r>
+              <a:rPr lang="it-IT" altLang="en-US" sz="2400" i="1" dirty="0" err="1">
+                <a:solidFill>
+                  <a:schemeClr val="tx1"/>
+                </a:solidFill>
+              </a:rPr>
+              <a:t>disaggregation</a:t>
+            </a:r>
+            <a:r>
+              <a:rPr lang="it-IT" altLang="en-US" sz="2400" i="1" dirty="0">
+                <a:solidFill>
+                  <a:schemeClr val="tx1"/>
+                </a:solidFill>
+              </a:rPr>
+              <a:t> </a:t>
+            </a:r>
+            <a:r>
+              <a:rPr lang="it-IT" altLang="en-US" sz="2400" i="1" dirty="0" err="1" smtClean="0">
+                <a:solidFill>
+                  <a:schemeClr val="tx1"/>
+                </a:solidFill>
+              </a:rPr>
+              <a:t>categories</a:t>
+            </a:r>
+            <a:endParaRPr lang="it-IT" altLang="en-US" sz="2400" i="1" dirty="0">
               <a:solidFill>
                 <a:schemeClr val="tx1"/>
               </a:solidFill>
@@ -11814,7 +11963,7 @@
         </p:nvSpPr>
         <p:spPr>
           <a:xfrm>
-            <a:off x="767408" y="5877696"/>
+            <a:off x="191344" y="5877272"/>
             <a:ext cx="8314266" cy="719656"/>
           </a:xfrm>
           <a:prstGeom prst="rect">
@@ -11900,46 +12049,70 @@
           <a:p>
             <a:pPr algn="ctr"/>
             <a:r>
-              <a:rPr lang="en-US" altLang="en-US" sz="2400" i="1" dirty="0">
+              <a:rPr lang="it-IT" altLang="en-US" sz="2400" i="1" dirty="0">
                 <a:solidFill>
                   <a:schemeClr val="tx1"/>
                 </a:solidFill>
               </a:rPr>
-              <a:t>d</a:t>
-            </a:r>
-            <a:r>
-              <a:rPr lang="en-US" altLang="en-US" sz="2400" i="1" dirty="0" smtClean="0">
+              <a:t>data </a:t>
+            </a:r>
+            <a:r>
+              <a:rPr lang="it-IT" altLang="en-US" sz="2400" i="1" dirty="0" err="1">
                 <a:solidFill>
                   <a:schemeClr val="tx1"/>
                 </a:solidFill>
               </a:rPr>
-              <a:t>ata </a:t>
-            </a:r>
-            <a:r>
-              <a:rPr lang="en-US" altLang="en-US" sz="2400" i="1" dirty="0">
+              <a:t>element</a:t>
+            </a:r>
+            <a:r>
+              <a:rPr lang="it-IT" altLang="en-US" sz="2400" i="1" dirty="0">
                 <a:solidFill>
                   <a:schemeClr val="tx1"/>
                 </a:solidFill>
               </a:rPr>
-              <a:t>s</a:t>
-            </a:r>
-            <a:r>
-              <a:rPr lang="en-US" altLang="en-US" sz="2400" i="1" dirty="0" smtClean="0">
+              <a:t> </a:t>
+            </a:r>
+            <a:r>
+              <a:rPr lang="it-IT" altLang="en-US" sz="2400" i="1" dirty="0" err="1">
                 <a:solidFill>
                   <a:schemeClr val="tx1"/>
                 </a:solidFill>
               </a:rPr>
-              <a:t>et dimensions: </a:t>
-            </a:r>
-            <a:r>
-              <a:rPr lang="en-US" altLang="en-US" sz="2400" i="1" dirty="0">
+              <a:t>dimensions</a:t>
+            </a:r>
+            <a:r>
+              <a:rPr lang="it-IT" altLang="en-US" sz="2400" i="1" dirty="0">
                 <a:solidFill>
                   <a:schemeClr val="tx1"/>
                 </a:solidFill>
               </a:rPr>
-              <a:t>Attribute Options</a:t>
-            </a:r>
-            <a:endParaRPr lang="x-none" altLang="en-US" sz="2400" i="1" dirty="0">
+              <a:t>: </a:t>
+            </a:r>
+            <a:r>
+              <a:rPr lang="it-IT" altLang="en-US" sz="2400" i="1" dirty="0" err="1">
+                <a:solidFill>
+                  <a:schemeClr val="tx1"/>
+                </a:solidFill>
+              </a:rPr>
+              <a:t>disaggregation</a:t>
+            </a:r>
+            <a:r>
+              <a:rPr lang="it-IT" altLang="en-US" sz="2400" i="1" dirty="0">
+                <a:solidFill>
+                  <a:schemeClr val="tx1"/>
+                </a:solidFill>
+              </a:rPr>
+              <a:t> </a:t>
+            </a:r>
+            <a:r>
+              <a:rPr lang="it-IT" altLang="en-US" sz="2400" i="1" dirty="0" err="1" smtClean="0">
+                <a:solidFill>
+                  <a:schemeClr val="tx1"/>
+                </a:solidFill>
+              </a:rPr>
+              <a:t>categories</a:t>
+            </a:r>
+            <a:endParaRPr lang="it-IT" altLang="en-US" sz="2400" i="1" dirty="0">
               <a:solidFill>
                 <a:schemeClr val="tx1"/>
               </a:solidFill>
@@ -12790,8 +12963,8 @@
         </p:nvSpPr>
         <p:spPr>
           <a:xfrm>
-            <a:off x="767408" y="5877272"/>
-            <a:ext cx="8314266" cy="719656"/>
+            <a:off x="407368" y="5877272"/>
+            <a:ext cx="7848872" cy="719656"/>
           </a:xfrm>
           <a:prstGeom prst="rect">
             <a:avLst/>
@@ -12881,45 +13054,8 @@
                   <a:schemeClr val="tx1"/>
                 </a:solidFill>
               </a:rPr>
-              <a:t>d</a:t>
-            </a:r>
-            <a:r>
-              <a:rPr lang="en-US" altLang="en-US" sz="2400" i="1" dirty="0" smtClean="0">
-                <a:solidFill>
-                  <a:schemeClr val="tx1"/>
-                </a:solidFill>
-              </a:rPr>
-              <a:t>ata </a:t>
-            </a:r>
-            <a:r>
-              <a:rPr lang="en-US" altLang="en-US" sz="2400" i="1" dirty="0">
-                <a:solidFill>
-                  <a:schemeClr val="tx1"/>
-                </a:solidFill>
-              </a:rPr>
-              <a:t>s</a:t>
-            </a:r>
-            <a:r>
-              <a:rPr lang="en-US" altLang="en-US" sz="2400" i="1" dirty="0" smtClean="0">
-                <a:solidFill>
-                  <a:schemeClr val="tx1"/>
-                </a:solidFill>
-              </a:rPr>
-              <a:t>et dimensions: </a:t>
-            </a:r>
-            <a:r>
-              <a:rPr lang="en-US" altLang="en-US" sz="2400" i="1" dirty="0">
-                <a:solidFill>
-                  <a:schemeClr val="tx1"/>
-                </a:solidFill>
-              </a:rPr>
-              <a:t>Attribute Options</a:t>
-            </a:r>
-            <a:endParaRPr lang="x-none" altLang="en-US" sz="2400" i="1" dirty="0">
-              <a:solidFill>
-                <a:schemeClr val="tx1"/>
-              </a:solidFill>
-            </a:endParaRPr>
+              <a:t>data set dimensions: attribute categories</a:t>
+            </a:r>
           </a:p>
         </p:txBody>
       </p:sp>
@@ -13365,12 +13501,12 @@
               <a:t>	</a:t>
             </a:r>
             <a:r>
-              <a:rPr lang="en-US" sz="2400" dirty="0" smtClean="0">
+              <a:rPr lang="en-US" altLang="en-US" sz="2400" i="1" dirty="0" smtClean="0">
                 <a:solidFill>
                   <a:schemeClr val="accent2"/>
                 </a:solidFill>
               </a:rPr>
-              <a:t>	</a:t>
+              <a:t>data </a:t>
             </a:r>
             <a:r>
               <a:rPr lang="en-US" altLang="en-US" sz="2400" i="1" dirty="0">
@@ -13378,7 +13514,7 @@
                   <a:schemeClr val="accent2"/>
                 </a:solidFill>
               </a:rPr>
-              <a:t>data set dimensions: Attribute Options</a:t>
+              <a:t>set dimensions using attribute categories</a:t>
             </a:r>
           </a:p>
           <a:p>
@@ -13400,12 +13536,12 @@
               <a:t>	</a:t>
             </a:r>
             <a:r>
-              <a:rPr lang="en-US" sz="2400" dirty="0" smtClean="0"/>
-              <a:t>	</a:t>
+              <a:rPr lang="en-US" altLang="en-US" sz="2400" i="1" dirty="0" smtClean="0"/>
+              <a:t>category </a:t>
             </a:r>
             <a:r>
               <a:rPr lang="en-US" altLang="en-US" sz="2400" i="1" dirty="0"/>
-              <a:t>category option </a:t>
+              <a:t>option </a:t>
             </a:r>
             <a:r>
               <a:rPr lang="en-US" altLang="en-US" sz="2400" i="1" dirty="0" smtClean="0"/>
@@ -14428,8 +14564,8 @@
         </p:nvSpPr>
         <p:spPr>
           <a:xfrm>
-            <a:off x="767408" y="5877696"/>
-            <a:ext cx="8314266" cy="719656"/>
+            <a:off x="407368" y="5877272"/>
+            <a:ext cx="7560840" cy="719656"/>
           </a:xfrm>
           <a:prstGeom prst="rect">
             <a:avLst/>
@@ -14747,9 +14883,39 @@
           <a:chExt cx="0" cy="0"/>
         </a:xfrm>
       </p:grpSpPr>
-      <p:sp>
-        <p:nvSpPr>
-          <p:cNvPr id="5" name="Shape 125"/>
+      <p:pic>
+        <p:nvPicPr>
+          <p:cNvPr id="6" name="Picture 5" descr="Untitled.jpg"/>
+          <p:cNvPicPr>
+            <a:picLocks noChangeAspect="1"/>
+          </p:cNvPicPr>
+          <p:nvPr/>
+        </p:nvPicPr>
+        <p:blipFill>
+          <a:blip r:embed="rId2">
+            <a:extLst>
+              <a:ext uri="{28A0092B-C50C-407E-A947-70E740481C1C}">
+                <a14:useLocalDpi xmlns:a14="http://schemas.microsoft.com/office/drawing/2010/main" val="0"/>
+              </a:ext>
+            </a:extLst>
+          </a:blip>
+          <a:stretch>
+            <a:fillRect/>
+          </a:stretch>
+        </p:blipFill>
+        <p:spPr>
+          <a:xfrm>
+            <a:off x="479376" y="2573621"/>
+            <a:ext cx="1944216" cy="3035215"/>
+          </a:xfrm>
+          <a:prstGeom prst="rect">
+            <a:avLst/>
+          </a:prstGeom>
+        </p:spPr>
+      </p:pic>
+      <p:sp>
+        <p:nvSpPr>
+          <p:cNvPr id="8" name="Shape 118"/>
           <p:cNvSpPr txBox="1">
             <a:spLocks/>
           </p:cNvSpPr>
@@ -14757,7 +14923,7 @@
         </p:nvSpPr>
         <p:spPr>
           <a:xfrm>
-            <a:off x="2639616" y="3501008"/>
+            <a:off x="2539896" y="3507752"/>
             <a:ext cx="5112300" cy="784800"/>
           </a:xfrm>
           <a:prstGeom prst="rect">
@@ -15015,9 +15181,9 @@
                 <a:solidFill>
                   <a:schemeClr val="tx1"/>
                 </a:solidFill>
-                <a:latin typeface="Montserrat"/>
+                <a:latin typeface="Rubik Medium"/>
                 <a:ea typeface="Montserrat"/>
-                <a:cs typeface="Montserrat"/>
+                <a:cs typeface="Rubik Medium"/>
                 <a:sym typeface="Montserrat"/>
               </a:rPr>
               <a:t>Jim Grace</a:t>
@@ -15026,9 +15192,9 @@
               <a:solidFill>
                 <a:schemeClr val="tx1"/>
               </a:solidFill>
-              <a:latin typeface="Montserrat"/>
+              <a:latin typeface="Rubik Medium"/>
               <a:ea typeface="Montserrat"/>
-              <a:cs typeface="Montserrat"/>
+              <a:cs typeface="Rubik Medium"/>
               <a:sym typeface="Montserrat"/>
             </a:endParaRPr>
           </a:p>
@@ -15036,7 +15202,7 @@
       </p:sp>
       <p:sp>
         <p:nvSpPr>
-          <p:cNvPr id="7" name="Shape 127"/>
+          <p:cNvPr id="9" name="Shape 119"/>
           <p:cNvSpPr txBox="1">
             <a:spLocks/>
           </p:cNvSpPr>
@@ -15044,8 +15210,8 @@
         </p:nvSpPr>
         <p:spPr>
           <a:xfrm>
-            <a:off x="2699460" y="4614252"/>
-            <a:ext cx="4692416" cy="686956"/>
+            <a:off x="2568470" y="4472265"/>
+            <a:ext cx="7559978" cy="1007100"/>
           </a:xfrm>
           <a:prstGeom prst="rect">
             <a:avLst/>
@@ -15292,65 +15458,44 @@
                 <a:spcPts val="0"/>
               </a:spcBef>
               <a:buClr>
-                <a:schemeClr val="dk2"/>
+                <a:srgbClr val="666666"/>
               </a:buClr>
               <a:buFont typeface="Karla"/>
               <a:buNone/>
             </a:pPr>
             <a:r>
-              <a:rPr lang="en-US" sz="3200" dirty="0" smtClean="0">
-                <a:solidFill>
-                  <a:schemeClr val="tx1"/>
-                </a:solidFill>
-                <a:latin typeface="Montserrat"/>
+              <a:rPr lang="en-US" sz="3000" i="1" dirty="0">
+                <a:solidFill>
+                  <a:srgbClr val="000000"/>
+                </a:solidFill>
                 <a:ea typeface="Montserrat"/>
-                <a:cs typeface="Montserrat"/>
+                <a:cs typeface="Trebuchet MS"/>
                 <a:sym typeface="Montserrat"/>
               </a:rPr>
-              <a:t>DHIS 2 Core Developer</a:t>
-            </a:r>
-            <a:endParaRPr lang="en-US" sz="3200" dirty="0">
+              <a:t>DHIS2 Core </a:t>
+            </a:r>
+            <a:r>
+              <a:rPr lang="en-US" sz="3000" i="1" dirty="0" smtClean="0">
+                <a:solidFill>
+                  <a:srgbClr val="000000"/>
+                </a:solidFill>
+                <a:ea typeface="Montserrat"/>
+                <a:cs typeface="Trebuchet MS"/>
+                <a:sym typeface="Montserrat"/>
+              </a:rPr>
+              <a:t>Developer</a:t>
+            </a:r>
+            <a:endParaRPr lang="en-US" sz="3000" i="1" dirty="0">
               <a:solidFill>
-                <a:schemeClr val="tx1"/>
+                <a:srgbClr val="000000"/>
               </a:solidFill>
-              <a:latin typeface="Montserrat"/>
               <a:ea typeface="Montserrat"/>
-              <a:cs typeface="Montserrat"/>
+              <a:cs typeface="Trebuchet MS"/>
               <a:sym typeface="Montserrat"/>
             </a:endParaRPr>
           </a:p>
         </p:txBody>
       </p:sp>
-      <p:pic>
-        <p:nvPicPr>
-          <p:cNvPr id="2" name="Picture 1" descr="jim_no_background-2.png"/>
-          <p:cNvPicPr>
-            <a:picLocks noChangeAspect="1"/>
-          </p:cNvPicPr>
-          <p:nvPr/>
-        </p:nvPicPr>
-        <p:blipFill>
-          <a:blip r:embed="rId2">
-            <a:extLst>
-              <a:ext uri="{28A0092B-C50C-407E-A947-70E740481C1C}">
-                <a14:useLocalDpi xmlns:a14="http://schemas.microsoft.com/office/drawing/2010/main" val="0"/>
-              </a:ext>
-            </a:extLst>
-          </a:blip>
-          <a:stretch>
-            <a:fillRect/>
-          </a:stretch>
-        </p:blipFill>
-        <p:spPr>
-          <a:xfrm>
-            <a:off x="479376" y="2554069"/>
-            <a:ext cx="1944216" cy="3035171"/>
-          </a:xfrm>
-          <a:prstGeom prst="rect">
-            <a:avLst/>
-          </a:prstGeom>
-        </p:spPr>
-      </p:pic>
     </p:spTree>
     <p:extLst>
       <p:ext uri="{BB962C8B-B14F-4D97-AF65-F5344CB8AC3E}">
@@ -15921,133 +16066,6 @@
       </p:sp>
       <p:sp>
         <p:nvSpPr>
-          <p:cNvPr id="24" name="Title 1"/>
-          <p:cNvSpPr txBox="1">
-            <a:spLocks/>
-          </p:cNvSpPr>
-          <p:nvPr/>
-        </p:nvSpPr>
-        <p:spPr>
-          <a:xfrm>
-            <a:off x="767408" y="5877696"/>
-            <a:ext cx="8314266" cy="719656"/>
-          </a:xfrm>
-          <a:prstGeom prst="rect">
-            <a:avLst/>
-          </a:prstGeom>
-        </p:spPr>
-        <p:txBody>
-          <a:bodyPr vert="horz" lIns="91440" tIns="45720" rIns="91440" bIns="45720" rtlCol="0" anchor="t">
-            <a:noAutofit/>
-          </a:bodyPr>
-          <a:lstStyle>
-            <a:lvl1pPr algn="l" defTabSz="457200" rtl="0" eaLnBrk="1" latinLnBrk="0" hangingPunct="1">
-              <a:spcBef>
-                <a:spcPct val="0"/>
-              </a:spcBef>
-              <a:buNone/>
-              <a:defRPr sz="3600" kern="1200">
-                <a:solidFill>
-                  <a:schemeClr val="accent1"/>
-                </a:solidFill>
-                <a:latin typeface="+mj-lt"/>
-                <a:ea typeface="+mj-ea"/>
-                <a:cs typeface="+mj-cs"/>
-              </a:defRPr>
-            </a:lvl1pPr>
-            <a:lvl2pPr eaLnBrk="1" hangingPunct="1">
-              <a:defRPr>
-                <a:solidFill>
-                  <a:schemeClr val="tx2"/>
-                </a:solidFill>
-              </a:defRPr>
-            </a:lvl2pPr>
-            <a:lvl3pPr eaLnBrk="1" hangingPunct="1">
-              <a:defRPr>
-                <a:solidFill>
-                  <a:schemeClr val="tx2"/>
-                </a:solidFill>
-              </a:defRPr>
-            </a:lvl3pPr>
-            <a:lvl4pPr eaLnBrk="1" hangingPunct="1">
-              <a:defRPr>
-                <a:solidFill>
-                  <a:schemeClr val="tx2"/>
-                </a:solidFill>
-              </a:defRPr>
-            </a:lvl4pPr>
-            <a:lvl5pPr eaLnBrk="1" hangingPunct="1">
-              <a:defRPr>
-                <a:solidFill>
-                  <a:schemeClr val="tx2"/>
-                </a:solidFill>
-              </a:defRPr>
-            </a:lvl5pPr>
-            <a:lvl6pPr eaLnBrk="1" hangingPunct="1">
-              <a:defRPr>
-                <a:solidFill>
-                  <a:schemeClr val="tx2"/>
-                </a:solidFill>
-              </a:defRPr>
-            </a:lvl6pPr>
-            <a:lvl7pPr eaLnBrk="1" hangingPunct="1">
-              <a:defRPr>
-                <a:solidFill>
-                  <a:schemeClr val="tx2"/>
-                </a:solidFill>
-              </a:defRPr>
-            </a:lvl7pPr>
-            <a:lvl8pPr eaLnBrk="1" hangingPunct="1">
-              <a:defRPr>
-                <a:solidFill>
-                  <a:schemeClr val="tx2"/>
-                </a:solidFill>
-              </a:defRPr>
-            </a:lvl8pPr>
-            <a:lvl9pPr eaLnBrk="1" hangingPunct="1">
-              <a:defRPr>
-                <a:solidFill>
-                  <a:schemeClr val="tx2"/>
-                </a:solidFill>
-              </a:defRPr>
-            </a:lvl9pPr>
-          </a:lstStyle>
-          <a:p>
-            <a:pPr algn="ctr"/>
-            <a:r>
-              <a:rPr lang="en-US" altLang="en-US" sz="2400" i="1" dirty="0">
-                <a:solidFill>
-                  <a:schemeClr val="tx1"/>
-                </a:solidFill>
-              </a:rPr>
-              <a:t>category option </a:t>
-            </a:r>
-            <a:r>
-              <a:rPr lang="en-US" altLang="en-US" sz="2400" i="1" dirty="0" smtClean="0">
-                <a:solidFill>
-                  <a:schemeClr val="tx1"/>
-                </a:solidFill>
-              </a:rPr>
-              <a:t>groups </a:t>
-            </a:r>
-            <a:r>
-              <a:rPr lang="en-US" altLang="en-US" sz="2400" i="1" dirty="0">
-                <a:solidFill>
-                  <a:schemeClr val="tx1"/>
-                </a:solidFill>
-              </a:rPr>
-              <a:t>and group sets</a:t>
-            </a:r>
-            <a:endParaRPr lang="x-none" altLang="en-US" sz="2400" i="1" dirty="0">
-              <a:solidFill>
-                <a:schemeClr val="tx1"/>
-              </a:solidFill>
-            </a:endParaRPr>
-          </a:p>
-        </p:txBody>
-      </p:sp>
-      <p:sp>
-        <p:nvSpPr>
           <p:cNvPr id="26" name="TextBox 25"/>
           <p:cNvSpPr txBox="1"/>
           <p:nvPr/>
@@ -16324,6 +16342,157 @@
               <a:t>mechanism</a:t>
             </a:r>
             <a:endParaRPr lang="en-US" i="1" dirty="0"/>
+          </a:p>
+        </p:txBody>
+      </p:sp>
+      <p:sp>
+        <p:nvSpPr>
+          <p:cNvPr id="41" name="Title 1"/>
+          <p:cNvSpPr txBox="1">
+            <a:spLocks/>
+          </p:cNvSpPr>
+          <p:nvPr/>
+        </p:nvSpPr>
+        <p:spPr>
+          <a:xfrm>
+            <a:off x="407368" y="5877696"/>
+            <a:ext cx="7560840" cy="719656"/>
+          </a:xfrm>
+          <a:prstGeom prst="rect">
+            <a:avLst/>
+          </a:prstGeom>
+        </p:spPr>
+        <p:txBody>
+          <a:bodyPr vert="horz" lIns="91440" tIns="45720" rIns="91440" bIns="45720" rtlCol="0" anchor="t">
+            <a:noAutofit/>
+          </a:bodyPr>
+          <a:lstStyle>
+            <a:lvl1pPr algn="l" defTabSz="457200" rtl="0" eaLnBrk="1" latinLnBrk="0" hangingPunct="1">
+              <a:spcBef>
+                <a:spcPct val="0"/>
+              </a:spcBef>
+              <a:buNone/>
+              <a:defRPr sz="3600" kern="1200">
+                <a:solidFill>
+                  <a:schemeClr val="accent1"/>
+                </a:solidFill>
+                <a:latin typeface="+mj-lt"/>
+                <a:ea typeface="+mj-ea"/>
+                <a:cs typeface="+mj-cs"/>
+              </a:defRPr>
+            </a:lvl1pPr>
+            <a:lvl2pPr eaLnBrk="1" hangingPunct="1">
+              <a:defRPr>
+                <a:solidFill>
+                  <a:schemeClr val="tx2"/>
+                </a:solidFill>
+              </a:defRPr>
+            </a:lvl2pPr>
+            <a:lvl3pPr eaLnBrk="1" hangingPunct="1">
+              <a:defRPr>
+                <a:solidFill>
+                  <a:schemeClr val="tx2"/>
+                </a:solidFill>
+              </a:defRPr>
+            </a:lvl3pPr>
+            <a:lvl4pPr eaLnBrk="1" hangingPunct="1">
+              <a:defRPr>
+                <a:solidFill>
+                  <a:schemeClr val="tx2"/>
+                </a:solidFill>
+              </a:defRPr>
+            </a:lvl4pPr>
+            <a:lvl5pPr eaLnBrk="1" hangingPunct="1">
+              <a:defRPr>
+                <a:solidFill>
+                  <a:schemeClr val="tx2"/>
+                </a:solidFill>
+              </a:defRPr>
+            </a:lvl5pPr>
+            <a:lvl6pPr eaLnBrk="1" hangingPunct="1">
+              <a:defRPr>
+                <a:solidFill>
+                  <a:schemeClr val="tx2"/>
+                </a:solidFill>
+              </a:defRPr>
+            </a:lvl6pPr>
+            <a:lvl7pPr eaLnBrk="1" hangingPunct="1">
+              <a:defRPr>
+                <a:solidFill>
+                  <a:schemeClr val="tx2"/>
+                </a:solidFill>
+              </a:defRPr>
+            </a:lvl7pPr>
+            <a:lvl8pPr eaLnBrk="1" hangingPunct="1">
+              <a:defRPr>
+                <a:solidFill>
+                  <a:schemeClr val="tx2"/>
+                </a:solidFill>
+              </a:defRPr>
+            </a:lvl8pPr>
+            <a:lvl9pPr eaLnBrk="1" hangingPunct="1">
+              <a:defRPr>
+                <a:solidFill>
+                  <a:schemeClr val="tx2"/>
+                </a:solidFill>
+              </a:defRPr>
+            </a:lvl9pPr>
+          </a:lstStyle>
+          <a:p>
+            <a:pPr algn="ctr"/>
+            <a:r>
+              <a:rPr lang="en-US" altLang="en-US" sz="2400" i="1" dirty="0">
+                <a:solidFill>
+                  <a:schemeClr val="tx1"/>
+                </a:solidFill>
+              </a:rPr>
+              <a:t>c</a:t>
+            </a:r>
+            <a:r>
+              <a:rPr lang="en-US" altLang="en-US" sz="2400" i="1" dirty="0" smtClean="0">
+                <a:solidFill>
+                  <a:schemeClr val="tx1"/>
+                </a:solidFill>
+              </a:rPr>
+              <a:t>ategory </a:t>
+            </a:r>
+            <a:r>
+              <a:rPr lang="en-US" altLang="en-US" sz="2400" i="1" dirty="0">
+                <a:solidFill>
+                  <a:schemeClr val="tx1"/>
+                </a:solidFill>
+              </a:rPr>
+              <a:t>o</a:t>
+            </a:r>
+            <a:r>
+              <a:rPr lang="en-US" altLang="en-US" sz="2400" i="1" dirty="0" smtClean="0">
+                <a:solidFill>
+                  <a:schemeClr val="tx1"/>
+                </a:solidFill>
+              </a:rPr>
+              <a:t>ption groups and group </a:t>
+            </a:r>
+            <a:r>
+              <a:rPr lang="en-US" altLang="en-US" sz="2400" i="1" dirty="0">
+                <a:solidFill>
+                  <a:schemeClr val="tx1"/>
+                </a:solidFill>
+              </a:rPr>
+              <a:t>s</a:t>
+            </a:r>
+            <a:r>
+              <a:rPr lang="en-US" altLang="en-US" sz="2400" i="1" dirty="0" smtClean="0">
+                <a:solidFill>
+                  <a:schemeClr val="tx1"/>
+                </a:solidFill>
+              </a:rPr>
+              <a:t>ets</a:t>
+            </a:r>
+            <a:endParaRPr lang="x-none" altLang="en-US" sz="2400" i="1" dirty="0" smtClean="0">
+              <a:solidFill>
+                <a:schemeClr val="tx1"/>
+              </a:solidFill>
+            </a:endParaRPr>
           </a:p>
         </p:txBody>
       </p:sp>
@@ -17253,117 +17422,6 @@
       </p:sp>
       <p:sp>
         <p:nvSpPr>
-          <p:cNvPr id="24" name="Title 1"/>
-          <p:cNvSpPr txBox="1">
-            <a:spLocks/>
-          </p:cNvSpPr>
-          <p:nvPr/>
-        </p:nvSpPr>
-        <p:spPr>
-          <a:xfrm>
-            <a:off x="695400" y="5877696"/>
-            <a:ext cx="8314266" cy="719656"/>
-          </a:xfrm>
-          <a:prstGeom prst="rect">
-            <a:avLst/>
-          </a:prstGeom>
-        </p:spPr>
-        <p:txBody>
-          <a:bodyPr vert="horz" lIns="91440" tIns="45720" rIns="91440" bIns="45720" rtlCol="0" anchor="t">
-            <a:noAutofit/>
-          </a:bodyPr>
-          <a:lstStyle>
-            <a:lvl1pPr algn="l" defTabSz="457200" rtl="0" eaLnBrk="1" latinLnBrk="0" hangingPunct="1">
-              <a:spcBef>
-                <a:spcPct val="0"/>
-              </a:spcBef>
-              <a:buNone/>
-              <a:defRPr sz="3600" kern="1200">
-                <a:solidFill>
-                  <a:schemeClr val="accent1"/>
-                </a:solidFill>
-                <a:latin typeface="+mj-lt"/>
-                <a:ea typeface="+mj-ea"/>
-                <a:cs typeface="+mj-cs"/>
-              </a:defRPr>
-            </a:lvl1pPr>
-            <a:lvl2pPr eaLnBrk="1" hangingPunct="1">
-              <a:defRPr>
-                <a:solidFill>
-                  <a:schemeClr val="tx2"/>
-                </a:solidFill>
-              </a:defRPr>
-            </a:lvl2pPr>
-            <a:lvl3pPr eaLnBrk="1" hangingPunct="1">
-              <a:defRPr>
-                <a:solidFill>
-                  <a:schemeClr val="tx2"/>
-                </a:solidFill>
-              </a:defRPr>
-            </a:lvl3pPr>
-            <a:lvl4pPr eaLnBrk="1" hangingPunct="1">
-              <a:defRPr>
-                <a:solidFill>
-                  <a:schemeClr val="tx2"/>
-                </a:solidFill>
-              </a:defRPr>
-            </a:lvl4pPr>
-            <a:lvl5pPr eaLnBrk="1" hangingPunct="1">
-              <a:defRPr>
-                <a:solidFill>
-                  <a:schemeClr val="tx2"/>
-                </a:solidFill>
-              </a:defRPr>
-            </a:lvl5pPr>
-            <a:lvl6pPr eaLnBrk="1" hangingPunct="1">
-              <a:defRPr>
-                <a:solidFill>
-                  <a:schemeClr val="tx2"/>
-                </a:solidFill>
-              </a:defRPr>
-            </a:lvl6pPr>
-            <a:lvl7pPr eaLnBrk="1" hangingPunct="1">
-              <a:defRPr>
-                <a:solidFill>
-                  <a:schemeClr val="tx2"/>
-                </a:solidFill>
-              </a:defRPr>
-            </a:lvl7pPr>
-            <a:lvl8pPr eaLnBrk="1" hangingPunct="1">
-              <a:defRPr>
-                <a:solidFill>
-                  <a:schemeClr val="tx2"/>
-                </a:solidFill>
-              </a:defRPr>
-            </a:lvl8pPr>
-            <a:lvl9pPr eaLnBrk="1" hangingPunct="1">
-              <a:defRPr>
-                <a:solidFill>
-                  <a:schemeClr val="tx2"/>
-                </a:solidFill>
-              </a:defRPr>
-            </a:lvl9pPr>
-          </a:lstStyle>
-          <a:p>
-            <a:pPr algn="ctr"/>
-            <a:r>
-              <a:rPr lang="en-US" altLang="en-US" sz="2400" i="1" dirty="0" smtClean="0">
-                <a:solidFill>
-                  <a:schemeClr val="tx1"/>
-                </a:solidFill>
-              </a:rPr>
-              <a:t>Possible future model for PEPFAR Subpartners</a:t>
-            </a:r>
-            <a:endParaRPr lang="x-none" altLang="en-US" sz="2400" i="1" dirty="0">
-              <a:solidFill>
-                <a:schemeClr val="tx1"/>
-              </a:solidFill>
-            </a:endParaRPr>
-          </a:p>
-        </p:txBody>
-      </p:sp>
-      <p:sp>
-        <p:nvSpPr>
           <p:cNvPr id="26" name="TextBox 25"/>
           <p:cNvSpPr txBox="1"/>
           <p:nvPr/>
@@ -18506,117 +18564,6 @@
       </p:sp>
       <p:sp>
         <p:nvSpPr>
-          <p:cNvPr id="24" name="Title 1"/>
-          <p:cNvSpPr txBox="1">
-            <a:spLocks/>
-          </p:cNvSpPr>
-          <p:nvPr/>
-        </p:nvSpPr>
-        <p:spPr>
-          <a:xfrm>
-            <a:off x="695400" y="5877696"/>
-            <a:ext cx="8314266" cy="719656"/>
-          </a:xfrm>
-          <a:prstGeom prst="rect">
-            <a:avLst/>
-          </a:prstGeom>
-        </p:spPr>
-        <p:txBody>
-          <a:bodyPr vert="horz" lIns="91440" tIns="45720" rIns="91440" bIns="45720" rtlCol="0" anchor="t">
-            <a:noAutofit/>
-          </a:bodyPr>
-          <a:lstStyle>
-            <a:lvl1pPr algn="l" defTabSz="457200" rtl="0" eaLnBrk="1" latinLnBrk="0" hangingPunct="1">
-              <a:spcBef>
-                <a:spcPct val="0"/>
-              </a:spcBef>
-              <a:buNone/>
-              <a:defRPr sz="3600" kern="1200">
-                <a:solidFill>
-                  <a:schemeClr val="accent1"/>
-                </a:solidFill>
-                <a:latin typeface="+mj-lt"/>
-                <a:ea typeface="+mj-ea"/>
-                <a:cs typeface="+mj-cs"/>
-              </a:defRPr>
-            </a:lvl1pPr>
-            <a:lvl2pPr eaLnBrk="1" hangingPunct="1">
-              <a:defRPr>
-                <a:solidFill>
-                  <a:schemeClr val="tx2"/>
-                </a:solidFill>
-              </a:defRPr>
-            </a:lvl2pPr>
-            <a:lvl3pPr eaLnBrk="1" hangingPunct="1">
-              <a:defRPr>
-                <a:solidFill>
-                  <a:schemeClr val="tx2"/>
-                </a:solidFill>
-              </a:defRPr>
-            </a:lvl3pPr>
-            <a:lvl4pPr eaLnBrk="1" hangingPunct="1">
-              <a:defRPr>
-                <a:solidFill>
-                  <a:schemeClr val="tx2"/>
-                </a:solidFill>
-              </a:defRPr>
-            </a:lvl4pPr>
-            <a:lvl5pPr eaLnBrk="1" hangingPunct="1">
-              <a:defRPr>
-                <a:solidFill>
-                  <a:schemeClr val="tx2"/>
-                </a:solidFill>
-              </a:defRPr>
-            </a:lvl5pPr>
-            <a:lvl6pPr eaLnBrk="1" hangingPunct="1">
-              <a:defRPr>
-                <a:solidFill>
-                  <a:schemeClr val="tx2"/>
-                </a:solidFill>
-              </a:defRPr>
-            </a:lvl6pPr>
-            <a:lvl7pPr eaLnBrk="1" hangingPunct="1">
-              <a:defRPr>
-                <a:solidFill>
-                  <a:schemeClr val="tx2"/>
-                </a:solidFill>
-              </a:defRPr>
-            </a:lvl7pPr>
-            <a:lvl8pPr eaLnBrk="1" hangingPunct="1">
-              <a:defRPr>
-                <a:solidFill>
-                  <a:schemeClr val="tx2"/>
-                </a:solidFill>
-              </a:defRPr>
-            </a:lvl8pPr>
-            <a:lvl9pPr eaLnBrk="1" hangingPunct="1">
-              <a:defRPr>
-                <a:solidFill>
-                  <a:schemeClr val="tx2"/>
-                </a:solidFill>
-              </a:defRPr>
-            </a:lvl9pPr>
-          </a:lstStyle>
-          <a:p>
-            <a:pPr algn="ctr"/>
-            <a:r>
-              <a:rPr lang="en-US" altLang="en-US" sz="2400" i="1" dirty="0">
-                <a:solidFill>
-                  <a:schemeClr val="tx1"/>
-                </a:solidFill>
-              </a:rPr>
-              <a:t>Possible future model for PEPFAR Subpartners</a:t>
-            </a:r>
-            <a:endParaRPr lang="x-none" altLang="en-US" sz="2400" i="1" dirty="0">
-              <a:solidFill>
-                <a:schemeClr val="tx1"/>
-              </a:solidFill>
-            </a:endParaRPr>
-          </a:p>
-        </p:txBody>
-      </p:sp>
-      <p:sp>
-        <p:nvSpPr>
           <p:cNvPr id="26" name="TextBox 25"/>
           <p:cNvSpPr txBox="1"/>
           <p:nvPr/>
@@ -19323,12 +19270,12 @@
               <a:t>	</a:t>
             </a:r>
             <a:r>
-              <a:rPr lang="en-US" sz="2400" dirty="0" smtClean="0">
+              <a:rPr lang="en-US" altLang="en-US" sz="2400" i="1" dirty="0" smtClean="0">
                 <a:solidFill>
                   <a:schemeClr val="accent2"/>
                 </a:solidFill>
               </a:rPr>
-              <a:t>	</a:t>
+              <a:t>data </a:t>
             </a:r>
             <a:r>
               <a:rPr lang="en-US" altLang="en-US" sz="2400" i="1" dirty="0">
@@ -19336,8 +19283,21 @@
                   <a:schemeClr val="accent2"/>
                 </a:solidFill>
               </a:rPr>
-              <a:t>data set dimensions: Attribute Options</a:t>
-            </a:r>
+              <a:t>set dimensions using attribute </a:t>
+            </a:r>
+            <a:r>
+              <a:rPr lang="en-US" altLang="en-US" sz="2400" i="1" dirty="0" smtClean="0">
+                <a:solidFill>
+                  <a:schemeClr val="accent2"/>
+                </a:solidFill>
+              </a:rPr>
+              <a:t>categories</a:t>
+            </a:r>
+            <a:endParaRPr lang="en-US" altLang="en-US" sz="2400" i="1" dirty="0">
+              <a:solidFill>
+                <a:schemeClr val="accent2"/>
+              </a:solidFill>
+            </a:endParaRPr>
           </a:p>
           <a:p>
             <a:endParaRPr lang="en-US" sz="2400" dirty="0" smtClean="0">
@@ -19366,12 +19326,12 @@
               <a:t>	</a:t>
             </a:r>
             <a:r>
-              <a:rPr lang="en-US" sz="2400" dirty="0" smtClean="0">
+              <a:rPr lang="en-US" altLang="en-US" sz="2400" i="1" dirty="0" smtClean="0">
                 <a:solidFill>
                   <a:schemeClr val="accent2"/>
                 </a:solidFill>
               </a:rPr>
-              <a:t>	</a:t>
+              <a:t>category </a:t>
             </a:r>
             <a:r>
               <a:rPr lang="en-US" altLang="en-US" sz="2400" i="1" dirty="0">
@@ -19379,7 +19339,7 @@
                   <a:schemeClr val="accent2"/>
                 </a:solidFill>
               </a:rPr>
-              <a:t>category option </a:t>
+              <a:t>option </a:t>
             </a:r>
             <a:r>
               <a:rPr lang="en-US" altLang="en-US" sz="2400" i="1" dirty="0" smtClean="0">
@@ -19419,7 +19379,7 @@
             </a:r>
             <a:r>
               <a:rPr lang="en-US" sz="2400" i="1" dirty="0" smtClean="0"/>
-              <a:t>	data approval levels</a:t>
+              <a:t>data approval levels</a:t>
             </a:r>
           </a:p>
           <a:p>
@@ -25295,9 +25255,9 @@
                 <a:solidFill>
                   <a:schemeClr val="tx1"/>
                 </a:solidFill>
-                <a:latin typeface="Montserrat"/>
+                <a:latin typeface="Rubik Medium"/>
                 <a:ea typeface="Montserrat"/>
-                <a:cs typeface="Montserrat"/>
+                <a:cs typeface="Rubik Medium"/>
                 <a:sym typeface="Montserrat"/>
               </a:rPr>
               <a:t>Ben Guaraldi</a:t>
@@ -25306,9 +25266,9 @@
               <a:solidFill>
                 <a:schemeClr val="tx1"/>
               </a:solidFill>
-              <a:latin typeface="Montserrat"/>
+              <a:latin typeface="Rubik Medium"/>
               <a:ea typeface="Montserrat"/>
-              <a:cs typeface="Montserrat"/>
+              <a:cs typeface="Rubik Medium"/>
               <a:sym typeface="Montserrat"/>
             </a:endParaRPr>
           </a:p>
@@ -25325,7 +25285,7 @@
         <p:spPr>
           <a:xfrm>
             <a:off x="2568470" y="4472265"/>
-            <a:ext cx="6983914" cy="1007100"/>
+            <a:ext cx="7559978" cy="1007100"/>
           </a:xfrm>
           <a:prstGeom prst="rect">
             <a:avLst/>
@@ -25578,47 +25538,47 @@
               <a:buNone/>
             </a:pPr>
             <a:r>
-              <a:rPr lang="en-US" sz="3200" dirty="0" smtClean="0">
+              <a:rPr lang="en-US" sz="3000" i="1" dirty="0" smtClean="0">
                 <a:solidFill>
                   <a:srgbClr val="000000"/>
                 </a:solidFill>
-                <a:latin typeface="Montserrat"/>
+                <a:latin typeface="Trebuchet MS"/>
                 <a:ea typeface="Montserrat"/>
-                <a:cs typeface="Montserrat"/>
+                <a:cs typeface="Trebuchet MS"/>
                 <a:sym typeface="Montserrat"/>
               </a:rPr>
-              <a:t>Technical Lead for DATIM</a:t>
+              <a:t>Development Team Lead for DATIM</a:t>
             </a:r>
             <a:br>
-              <a:rPr lang="en-US" sz="3200" dirty="0" smtClean="0">
+              <a:rPr lang="en-US" sz="3000" i="1" dirty="0" smtClean="0">
                 <a:solidFill>
                   <a:srgbClr val="000000"/>
                 </a:solidFill>
-                <a:latin typeface="Montserrat"/>
+                <a:latin typeface="Trebuchet MS"/>
                 <a:ea typeface="Montserrat"/>
-                <a:cs typeface="Montserrat"/>
+                <a:cs typeface="Trebuchet MS"/>
                 <a:sym typeface="Montserrat"/>
               </a:rPr>
             </a:br>
             <a:r>
-              <a:rPr lang="en-US" sz="3200" dirty="0" smtClean="0">
+              <a:rPr lang="en-US" sz="3000" i="1" dirty="0" smtClean="0">
                 <a:solidFill>
                   <a:srgbClr val="000000"/>
                 </a:solidFill>
-                <a:latin typeface="Montserrat"/>
+                <a:latin typeface="Trebuchet MS"/>
                 <a:ea typeface="Montserrat"/>
-                <a:cs typeface="Montserrat"/>
+                <a:cs typeface="Trebuchet MS"/>
                 <a:sym typeface="Montserrat"/>
               </a:rPr>
-              <a:t>(the PEPFAR installation of DHIS 2)</a:t>
-            </a:r>
-            <a:endParaRPr lang="en-US" sz="3200" dirty="0">
+              <a:t>(the PEPFAR installation of DHIS2)</a:t>
+            </a:r>
+            <a:endParaRPr lang="en-US" sz="3000" i="1" dirty="0">
               <a:solidFill>
                 <a:srgbClr val="000000"/>
               </a:solidFill>
-              <a:latin typeface="Montserrat"/>
+              <a:latin typeface="Trebuchet MS"/>
               <a:ea typeface="Montserrat"/>
-              <a:cs typeface="Montserrat"/>
+              <a:cs typeface="Trebuchet MS"/>
               <a:sym typeface="Montserrat"/>
             </a:endParaRPr>
           </a:p>
@@ -25928,7 +25888,38 @@
           <a:p>
             <a:r>
               <a:rPr lang="en-US" sz="2400" dirty="0" smtClean="0"/>
-              <a:t>1. Modelling mechanisms:</a:t>
+              <a:t>1. </a:t>
+            </a:r>
+            <a:r>
+              <a:rPr lang="en-US" sz="2400" dirty="0" err="1" smtClean="0"/>
+              <a:t>Modelling</a:t>
+            </a:r>
+            <a:r>
+              <a:rPr lang="en-US" sz="2400" dirty="0" smtClean="0"/>
+              <a:t> mechanisms:</a:t>
+            </a:r>
+          </a:p>
+          <a:p>
+            <a:r>
+              <a:rPr lang="en-US" sz="2400" dirty="0" smtClean="0"/>
+              <a:t>	</a:t>
+            </a:r>
+            <a:r>
+              <a:rPr lang="en-US" altLang="en-US" sz="2400" i="1" dirty="0" smtClean="0"/>
+              <a:t>data </a:t>
+            </a:r>
+            <a:r>
+              <a:rPr lang="en-US" altLang="en-US" sz="2400" i="1" dirty="0"/>
+              <a:t>set dimensions using attribute categories</a:t>
+            </a:r>
+          </a:p>
+          <a:p>
+            <a:endParaRPr lang="en-US" sz="2400" dirty="0" smtClean="0"/>
+          </a:p>
+          <a:p>
+            <a:r>
+              <a:rPr lang="en-US" sz="2400" dirty="0" smtClean="0"/>
+              <a:t>2. Modelling agencies and partners (and subpartners):</a:t>
             </a:r>
           </a:p>
           <a:p>
@@ -25937,35 +25928,12 @@
               <a:t>	</a:t>
             </a:r>
             <a:r>
-              <a:rPr lang="en-US" sz="2400" dirty="0" smtClean="0"/>
-              <a:t>	</a:t>
+              <a:rPr lang="en-US" altLang="en-US" sz="2400" i="1" dirty="0" smtClean="0"/>
+              <a:t>category </a:t>
             </a:r>
             <a:r>
               <a:rPr lang="en-US" altLang="en-US" sz="2400" i="1" dirty="0"/>
-              <a:t>data set dimensions: Attribute Options</a:t>
-            </a:r>
-          </a:p>
-          <a:p>
-            <a:endParaRPr lang="en-US" sz="2400" dirty="0" smtClean="0"/>
-          </a:p>
-          <a:p>
-            <a:r>
-              <a:rPr lang="en-US" sz="2400" dirty="0" smtClean="0"/>
-              <a:t>2. Modelling agencies and partners (and subpartners):</a:t>
-            </a:r>
-          </a:p>
-          <a:p>
-            <a:r>
-              <a:rPr lang="en-US" sz="2400" dirty="0"/>
-              <a:t>	</a:t>
-            </a:r>
-            <a:r>
-              <a:rPr lang="en-US" sz="2400" dirty="0" smtClean="0"/>
-              <a:t>	</a:t>
-            </a:r>
-            <a:r>
-              <a:rPr lang="en-US" altLang="en-US" sz="2400" i="1" dirty="0"/>
-              <a:t>category option </a:t>
+              <a:t>option </a:t>
             </a:r>
             <a:r>
               <a:rPr lang="en-US" altLang="en-US" sz="2400" i="1" dirty="0" smtClean="0"/>
@@ -25993,7 +25961,7 @@
             </a:r>
             <a:r>
               <a:rPr lang="en-US" sz="2400" i="1" dirty="0" smtClean="0"/>
-              <a:t>	data approval levels</a:t>
+              <a:t>data approval levels</a:t>
             </a:r>
           </a:p>
           <a:p>
@@ -26097,14 +26065,14 @@
           <a:p>
             <a:pPr algn="ctr"/>
             <a:r>
-              <a:rPr lang="en-US" altLang="en-US" sz="2400" i="1" dirty="0" smtClean="0">
+              <a:rPr lang="en-US" altLang="en-US" sz="2400" dirty="0" smtClean="0">
                 <a:solidFill>
                   <a:schemeClr val="tx1"/>
                 </a:solidFill>
               </a:rPr>
               <a:t>Thank you!</a:t>
             </a:r>
-            <a:endParaRPr lang="x-none" altLang="en-US" sz="2400" i="1" dirty="0">
+            <a:endParaRPr lang="x-none" altLang="en-US" sz="2400" dirty="0">
               <a:solidFill>
                 <a:schemeClr val="tx1"/>
               </a:solidFill>
@@ -26152,7 +26120,7 @@
         </p:nvSpPr>
         <p:spPr>
           <a:xfrm>
-            <a:off x="3187968" y="1196752"/>
+            <a:off x="2999656" y="1196752"/>
             <a:ext cx="4276184" cy="1000824"/>
           </a:xfrm>
           <a:prstGeom prst="rect">
@@ -26407,9 +26375,9 @@
             </a:pPr>
             <a:r>
               <a:rPr lang="en-US" sz="6000" dirty="0" smtClean="0">
-                <a:latin typeface="Montserrat"/>
+                <a:latin typeface="Rubik Medium"/>
                 <a:ea typeface="Montserrat"/>
-                <a:cs typeface="Montserrat"/>
+                <a:cs typeface="Rubik Medium"/>
                 <a:sym typeface="Montserrat"/>
               </a:rPr>
               <a:t>Jim Grace</a:t>
@@ -26418,9 +26386,9 @@
               <a:solidFill>
                 <a:srgbClr val="666666"/>
               </a:solidFill>
-              <a:latin typeface="Montserrat"/>
+              <a:latin typeface="Rubik Medium"/>
               <a:ea typeface="Montserrat"/>
-              <a:cs typeface="Montserrat"/>
+              <a:cs typeface="Rubik Medium"/>
               <a:sym typeface="Montserrat"/>
             </a:endParaRPr>
           </a:p>
@@ -26436,7 +26404,7 @@
         </p:nvSpPr>
         <p:spPr>
           <a:xfrm>
-            <a:off x="3187968" y="2204864"/>
+            <a:off x="2999656" y="2204864"/>
             <a:ext cx="3340080" cy="686956"/>
           </a:xfrm>
           <a:prstGeom prst="rect">
@@ -26690,21 +26658,21 @@
               <a:buNone/>
             </a:pPr>
             <a:r>
-              <a:rPr lang="en-US" sz="3200" dirty="0" smtClean="0">
+              <a:rPr lang="en-US" sz="3200" i="1" dirty="0" smtClean="0">
                 <a:solidFill>
                   <a:schemeClr val="dk2"/>
                 </a:solidFill>
-                <a:latin typeface="Montserrat"/>
+                <a:latin typeface="Trebuchet MS"/>
                 <a:ea typeface="Montserrat"/>
-                <a:cs typeface="Montserrat"/>
+                <a:cs typeface="Trebuchet MS"/>
                 <a:sym typeface="Montserrat"/>
               </a:rPr>
               <a:t>jim@dhis2.org</a:t>
             </a:r>
-            <a:endParaRPr lang="en-US" sz="3200" dirty="0">
-              <a:latin typeface="Montserrat"/>
+            <a:endParaRPr lang="en-US" sz="3200" i="1" dirty="0">
+              <a:latin typeface="Trebuchet MS"/>
               <a:ea typeface="Montserrat"/>
-              <a:cs typeface="Montserrat"/>
+              <a:cs typeface="Trebuchet MS"/>
               <a:sym typeface="Montserrat"/>
             </a:endParaRPr>
           </a:p>
@@ -26720,7 +26688,7 @@
         </p:nvSpPr>
         <p:spPr>
           <a:xfrm>
-            <a:off x="3187968" y="4581128"/>
+            <a:off x="2999656" y="4581128"/>
             <a:ext cx="5140280" cy="1003230"/>
           </a:xfrm>
           <a:prstGeom prst="rect">
@@ -26978,9 +26946,9 @@
                 <a:solidFill>
                   <a:srgbClr val="000000"/>
                 </a:solidFill>
-                <a:latin typeface="Montserrat"/>
+                <a:latin typeface="Rubik Medium"/>
                 <a:ea typeface="Montserrat"/>
-                <a:cs typeface="Montserrat"/>
+                <a:cs typeface="Rubik Medium"/>
                 <a:sym typeface="Montserrat"/>
               </a:rPr>
               <a:t>Ben Guaraldi</a:t>
@@ -26989,9 +26957,9 @@
               <a:solidFill>
                 <a:srgbClr val="000000"/>
               </a:solidFill>
-              <a:latin typeface="Montserrat"/>
+              <a:latin typeface="Rubik Medium"/>
               <a:ea typeface="Montserrat"/>
-              <a:cs typeface="Montserrat"/>
+              <a:cs typeface="Rubik Medium"/>
               <a:sym typeface="Montserrat"/>
             </a:endParaRPr>
           </a:p>
@@ -27007,7 +26975,7 @@
         </p:nvSpPr>
         <p:spPr>
           <a:xfrm>
-            <a:off x="3187968" y="5589240"/>
+            <a:off x="2999656" y="5589240"/>
             <a:ext cx="3743554" cy="758797"/>
           </a:xfrm>
           <a:prstGeom prst="rect">
@@ -27261,21 +27229,21 @@
               <a:buNone/>
             </a:pPr>
             <a:r>
-              <a:rPr lang="en-US" sz="3200" dirty="0" smtClean="0">
-                <a:latin typeface="Montserrat"/>
+              <a:rPr lang="en-US" sz="3200" i="1" dirty="0" smtClean="0">
+                <a:latin typeface="Trebuchet MS"/>
                 <a:ea typeface="Montserrat"/>
-                <a:cs typeface="Montserrat"/>
+                <a:cs typeface="Trebuchet MS"/>
                 <a:sym typeface="Montserrat"/>
               </a:rPr>
               <a:t>ben@dhis2.org</a:t>
             </a:r>
-            <a:endParaRPr lang="en-US" sz="3200" dirty="0">
+            <a:endParaRPr lang="en-US" sz="3200" i="1" dirty="0">
               <a:solidFill>
                 <a:srgbClr val="666666"/>
               </a:solidFill>
-              <a:latin typeface="Montserrat"/>
+              <a:latin typeface="Trebuchet MS"/>
               <a:ea typeface="Montserrat"/>
-              <a:cs typeface="Montserrat"/>
+              <a:cs typeface="Trebuchet MS"/>
               <a:sym typeface="Montserrat"/>
             </a:endParaRPr>
           </a:p>
@@ -27310,7 +27278,7 @@
       </p:pic>
       <p:pic>
         <p:nvPicPr>
-          <p:cNvPr id="11" name="Picture 10" descr="jim_no_background-2.png"/>
+          <p:cNvPr id="2" name="Picture 1" descr="Untitled.jpg"/>
           <p:cNvPicPr>
             <a:picLocks noChangeAspect="1"/>
           </p:cNvPicPr>
@@ -27330,8 +27298,8 @@
         </p:blipFill>
         <p:spPr>
           <a:xfrm>
-            <a:off x="1127448" y="451842"/>
-            <a:ext cx="1584176" cy="2473102"/>
+            <a:off x="1127448" y="332656"/>
+            <a:ext cx="1673050" cy="2611884"/>
           </a:xfrm>
           <a:prstGeom prst="rect">
             <a:avLst/>
@@ -27430,13 +27398,18 @@
               <a:t>	</a:t>
             </a:r>
             <a:r>
-              <a:rPr lang="en-US" sz="2400" dirty="0" smtClean="0"/>
-              <a:t>	</a:t>
+              <a:rPr lang="en-US" altLang="en-US" sz="2400" i="1" dirty="0" smtClean="0"/>
+              <a:t>data </a:t>
             </a:r>
             <a:r>
               <a:rPr lang="en-US" altLang="en-US" sz="2400" i="1" dirty="0"/>
-              <a:t>data set dimensions: Attribute Options</a:t>
-            </a:r>
+              <a:t>set </a:t>
+            </a:r>
+            <a:r>
+              <a:rPr lang="en-US" altLang="en-US" sz="2400" i="1" dirty="0" smtClean="0"/>
+              <a:t>dimensions using attribute categories</a:t>
+            </a:r>
+            <a:endParaRPr lang="en-US" altLang="en-US" sz="2400" i="1" dirty="0"/>
           </a:p>
           <a:p>
             <a:endParaRPr lang="en-US" sz="2400" dirty="0" smtClean="0"/>
@@ -27453,12 +27426,12 @@
               <a:t>	</a:t>
             </a:r>
             <a:r>
-              <a:rPr lang="en-US" sz="2400" dirty="0" smtClean="0"/>
-              <a:t>	</a:t>
+              <a:rPr lang="en-US" altLang="en-US" sz="2400" i="1" dirty="0" smtClean="0"/>
+              <a:t>category </a:t>
             </a:r>
             <a:r>
               <a:rPr lang="en-US" altLang="en-US" sz="2400" i="1" dirty="0"/>
-              <a:t>category option </a:t>
+              <a:t>option </a:t>
             </a:r>
             <a:r>
               <a:rPr lang="en-US" altLang="en-US" sz="2400" i="1" dirty="0" smtClean="0"/>
@@ -27486,7 +27459,7 @@
             </a:r>
             <a:r>
               <a:rPr lang="en-US" sz="2400" i="1" dirty="0" smtClean="0"/>
-              <a:t>	data approval levels</a:t>
+              <a:t>data approval levels</a:t>
             </a:r>
           </a:p>
           <a:p>
@@ -27586,18 +27559,9 @@
               <a:t>	</a:t>
             </a:r>
             <a:r>
-              <a:rPr lang="en-US" sz="2400" dirty="0" smtClean="0"/>
-              <a:t>	</a:t>
-            </a:r>
-            <a:r>
               <a:rPr lang="en-US" altLang="en-US" sz="2400" i="1" dirty="0"/>
-              <a:t>data set dimensions: Attribute </a:t>
-            </a:r>
-            <a:r>
-              <a:rPr lang="en-US" altLang="en-US" sz="2400" i="1" dirty="0" smtClean="0"/>
-              <a:t>Options</a:t>
-            </a:r>
-            <a:endParaRPr lang="en-US" sz="2400" dirty="0"/>
+              <a:t>data set dimensions using attribute categories</a:t>
+            </a:r>
           </a:p>
         </p:txBody>
       </p:sp>
@@ -28085,7 +28049,7 @@
             <a:pPr algn="ctr"/>
             <a:r>
               <a:rPr lang="en-US" sz="2400" dirty="0" smtClean="0"/>
-              <a:t>“funding mechanism” – essentially like a project</a:t>
+              <a:t>“implementing mechanism” — the PEPFAR name for a project</a:t>
             </a:r>
             <a:endParaRPr lang="en-US" sz="2400" dirty="0"/>
           </a:p>
@@ -29434,52 +29398,28 @@
           <a:p>
             <a:pPr algn="ctr"/>
             <a:r>
-              <a:rPr lang="en-US" altLang="en-US" sz="3200" i="1" dirty="0">
+              <a:rPr lang="en-US" altLang="en-US" sz="2900" i="1" dirty="0" smtClean="0">
                 <a:solidFill>
                   <a:schemeClr val="tx1"/>
                 </a:solidFill>
               </a:rPr>
-              <a:t>d</a:t>
-            </a:r>
-            <a:r>
-              <a:rPr lang="en-US" altLang="en-US" sz="3200" i="1" dirty="0" smtClean="0">
+              <a:t>data </a:t>
+            </a:r>
+            <a:r>
+              <a:rPr lang="en-US" altLang="en-US" sz="2900" b="1" dirty="0" smtClean="0">
                 <a:solidFill>
                   <a:schemeClr val="tx1"/>
                 </a:solidFill>
               </a:rPr>
-              <a:t>ata </a:t>
-            </a:r>
-            <a:r>
-              <a:rPr lang="en-US" altLang="en-US" sz="3200" i="1" dirty="0">
+              <a:t>element</a:t>
+            </a:r>
+            <a:r>
+              <a:rPr lang="en-US" altLang="en-US" sz="2900" i="1" dirty="0" smtClean="0">
                 <a:solidFill>
                   <a:schemeClr val="tx1"/>
                 </a:solidFill>
               </a:rPr>
-              <a:t>e</a:t>
-            </a:r>
-            <a:r>
-              <a:rPr lang="en-US" altLang="en-US" sz="3200" i="1" dirty="0" smtClean="0">
-                <a:solidFill>
-                  <a:schemeClr val="tx1"/>
-                </a:solidFill>
-              </a:rPr>
-              <a:t>lement </a:t>
-            </a:r>
-            <a:r>
-              <a:rPr lang="en-US" altLang="en-US" sz="3200" i="1" dirty="0">
-                <a:solidFill>
-                  <a:schemeClr val="tx1"/>
-                </a:solidFill>
-              </a:rPr>
-              <a:t>dimensions: Category </a:t>
-            </a:r>
-            <a:r>
-              <a:rPr lang="en-US" altLang="en-US" sz="3200" i="1" dirty="0" smtClean="0">
-                <a:solidFill>
-                  <a:schemeClr val="tx1"/>
-                </a:solidFill>
-              </a:rPr>
-              <a:t>Options</a:t>
+              <a:t> dimensions: disaggregation categories</a:t>
             </a:r>
           </a:p>
           <a:p>
@@ -29498,7 +29438,7 @@
                   <a:schemeClr val="tx1"/>
                 </a:solidFill>
               </a:rPr>
-              <a:t>(disaggregations: age, sex, test result, etc.)</a:t>
+              <a:t>(e.g., age, sex, test result; also called category options)</a:t>
             </a:r>
             <a:endParaRPr lang="x-none" altLang="en-US" sz="2400" i="1" dirty="0">
               <a:solidFill>
@@ -29604,7 +29544,7 @@
           <a:p>
             <a:pPr algn="ctr"/>
             <a:r>
-              <a:rPr lang="en-US" altLang="en-US" sz="3200" i="1" dirty="0">
+              <a:rPr lang="en-US" altLang="en-US" sz="2900" i="1" dirty="0">
                 <a:solidFill>
                   <a:schemeClr val="tx1"/>
                 </a:solidFill>
@@ -29612,7 +29552,7 @@
               <a:t>d</a:t>
             </a:r>
             <a:r>
-              <a:rPr lang="en-US" altLang="en-US" sz="3200" i="1" dirty="0" smtClean="0">
+              <a:rPr lang="en-US" altLang="en-US" sz="2900" i="1" dirty="0" smtClean="0">
                 <a:solidFill>
                   <a:schemeClr val="tx1"/>
                 </a:solidFill>
@@ -29620,7 +29560,7 @@
               <a:t>ata </a:t>
             </a:r>
             <a:r>
-              <a:rPr lang="en-US" altLang="en-US" sz="3200" i="1" dirty="0">
+              <a:rPr lang="en-US" altLang="en-US" sz="2900" b="1" dirty="0">
                 <a:solidFill>
                   <a:schemeClr val="tx1"/>
                 </a:solidFill>
@@ -29628,28 +29568,20 @@
               <a:t>s</a:t>
             </a:r>
             <a:r>
-              <a:rPr lang="en-US" altLang="en-US" sz="3200" i="1" dirty="0" smtClean="0">
+              <a:rPr lang="en-US" altLang="en-US" sz="2900" b="1" dirty="0" smtClean="0">
                 <a:solidFill>
                   <a:schemeClr val="tx1"/>
                 </a:solidFill>
               </a:rPr>
-              <a:t>et dimensions: </a:t>
-            </a:r>
-            <a:r>
-              <a:rPr lang="en-US" altLang="en-US" sz="3200" i="1" dirty="0">
+              <a:t>et</a:t>
+            </a:r>
+            <a:r>
+              <a:rPr lang="en-US" altLang="en-US" sz="2900" i="1" dirty="0" smtClean="0">
                 <a:solidFill>
                   <a:schemeClr val="tx1"/>
                 </a:solidFill>
               </a:rPr>
-              <a:t>Attribute </a:t>
-            </a:r>
-            <a:r>
-              <a:rPr lang="en-US" altLang="en-US" sz="3200" i="1" dirty="0" smtClean="0">
-                <a:solidFill>
-                  <a:schemeClr val="tx1"/>
-                </a:solidFill>
-              </a:rPr>
-              <a:t>Options</a:t>
+              <a:t> dimensions: attribute categories</a:t>
             </a:r>
           </a:p>
           <a:p>
@@ -29970,15 +29902,7 @@
                   <a:schemeClr val="tx1"/>
                 </a:solidFill>
               </a:rPr>
-              <a:t>et dimensions: </a:t>
-            </a:r>
-            <a:r>
-              <a:rPr lang="en-US" altLang="en-US" sz="2400" i="1" dirty="0">
-                <a:solidFill>
-                  <a:schemeClr val="tx1"/>
-                </a:solidFill>
-              </a:rPr>
-              <a:t>Attribute Options</a:t>
+              <a:t>et dimensions: attribute categories</a:t>
             </a:r>
             <a:endParaRPr lang="x-none" altLang="en-US" sz="2400" i="1" dirty="0">
               <a:solidFill>
@@ -30129,7 +30053,7 @@
                   <a:schemeClr val="tx1"/>
                 </a:solidFill>
               </a:rPr>
-              <a:t>Category Options</a:t>
+              <a:t>disaggregation categories</a:t>
             </a:r>
             <a:endParaRPr lang="x-none" altLang="en-US" sz="2400" i="1" dirty="0">
               <a:solidFill>
@@ -30257,10 +30181,16 @@
           </a:lstStyle>
           <a:p>
             <a:r>
-              <a:rPr lang="en-US" altLang="en-US" sz="2800" dirty="0" smtClean="0"/>
+              <a:rPr lang="en-US" altLang="en-US" sz="2800" dirty="0" smtClean="0">
+                <a:latin typeface="Rubik Medium"/>
+                <a:cs typeface="Rubik Medium"/>
+              </a:rPr>
               <a:t>Data Entry</a:t>
             </a:r>
-            <a:endParaRPr lang="x-none" altLang="en-US" sz="2800" dirty="0" smtClean="0"/>
+            <a:endParaRPr lang="x-none" altLang="en-US" sz="2800" dirty="0" smtClean="0">
+              <a:latin typeface="Rubik Medium"/>
+              <a:cs typeface="Rubik Medium"/>
+            </a:endParaRPr>
           </a:p>
         </p:txBody>
       </p:sp>

</xml_diff>

<commit_message>
Updates Complex Data Modelling slides
</commit_message>
<xml_diff>
--- a/Complex_Data_Modelling/Complex_Data_Modelling.pptx
+++ b/Complex_Data_Modelling/Complex_Data_Modelling.pptx
@@ -223,7 +223,7 @@
           <a:p>
             <a:fld id="{184EAD20-21E3-4489-9A2E-68C110AD5D79}" type="datetimeFigureOut">
               <a:rPr lang="en-GB" smtClean="0"/>
-              <a:t>6/18/19</a:t>
+              <a:t>6/20/19</a:t>
             </a:fld>
             <a:endParaRPr lang="en-GB" dirty="0"/>
           </a:p>
@@ -1320,7 +1320,7 @@
           <a:p>
             <a:fld id="{DDB1F609-DF0A-431B-B7BF-4A3DF144245D}" type="datetimeFigureOut">
               <a:rPr lang="de-DE" smtClean="0"/>
-              <a:t>6/18/19</a:t>
+              <a:t>6/20/19</a:t>
             </a:fld>
             <a:endParaRPr lang="de-DE" dirty="0"/>
           </a:p>
@@ -1596,7 +1596,7 @@
           <a:p>
             <a:fld id="{DDB1F609-DF0A-431B-B7BF-4A3DF144245D}" type="datetimeFigureOut">
               <a:rPr lang="de-DE" smtClean="0"/>
-              <a:t>6/18/19</a:t>
+              <a:t>6/20/19</a:t>
             </a:fld>
             <a:endParaRPr lang="de-DE" dirty="0"/>
           </a:p>
@@ -1905,7 +1905,7 @@
           <a:p>
             <a:fld id="{DDB1F609-DF0A-431B-B7BF-4A3DF144245D}" type="datetimeFigureOut">
               <a:rPr lang="de-DE" smtClean="0"/>
-              <a:t>6/18/19</a:t>
+              <a:t>6/20/19</a:t>
             </a:fld>
             <a:endParaRPr lang="de-DE" dirty="0"/>
           </a:p>
@@ -2233,7 +2233,7 @@
           <a:p>
             <a:fld id="{DDB1F609-DF0A-431B-B7BF-4A3DF144245D}" type="datetimeFigureOut">
               <a:rPr lang="de-DE" smtClean="0"/>
-              <a:t>6/18/19</a:t>
+              <a:t>6/20/19</a:t>
             </a:fld>
             <a:endParaRPr lang="de-DE" dirty="0"/>
           </a:p>
@@ -2542,7 +2542,7 @@
           <a:p>
             <a:fld id="{DDB1F609-DF0A-431B-B7BF-4A3DF144245D}" type="datetimeFigureOut">
               <a:rPr lang="de-DE" smtClean="0"/>
-              <a:t>6/18/19</a:t>
+              <a:t>6/20/19</a:t>
             </a:fld>
             <a:endParaRPr lang="de-DE" dirty="0"/>
           </a:p>
@@ -2930,7 +2930,7 @@
           <a:p>
             <a:fld id="{DDB1F609-DF0A-431B-B7BF-4A3DF144245D}" type="datetimeFigureOut">
               <a:rPr lang="de-DE" smtClean="0"/>
-              <a:t>6/18/19</a:t>
+              <a:t>6/20/19</a:t>
             </a:fld>
             <a:endParaRPr lang="de-DE" dirty="0"/>
           </a:p>
@@ -3095,7 +3095,7 @@
           <a:p>
             <a:fld id="{DDB1F609-DF0A-431B-B7BF-4A3DF144245D}" type="datetimeFigureOut">
               <a:rPr lang="de-DE" smtClean="0"/>
-              <a:t>6/18/19</a:t>
+              <a:t>6/20/19</a:t>
             </a:fld>
             <a:endParaRPr lang="de-DE" dirty="0"/>
           </a:p>
@@ -3270,7 +3270,7 @@
           <a:p>
             <a:fld id="{DDB1F609-DF0A-431B-B7BF-4A3DF144245D}" type="datetimeFigureOut">
               <a:rPr lang="de-DE" smtClean="0"/>
-              <a:t>6/18/19</a:t>
+              <a:t>6/20/19</a:t>
             </a:fld>
             <a:endParaRPr lang="de-DE" dirty="0"/>
           </a:p>
@@ -3435,7 +3435,7 @@
           <a:p>
             <a:fld id="{DDB1F609-DF0A-431B-B7BF-4A3DF144245D}" type="datetimeFigureOut">
               <a:rPr lang="de-DE" smtClean="0"/>
-              <a:t>6/18/19</a:t>
+              <a:t>6/20/19</a:t>
             </a:fld>
             <a:endParaRPr lang="de-DE" dirty="0"/>
           </a:p>
@@ -3677,7 +3677,7 @@
           <a:p>
             <a:fld id="{DDB1F609-DF0A-431B-B7BF-4A3DF144245D}" type="datetimeFigureOut">
               <a:rPr lang="de-DE" smtClean="0"/>
-              <a:t>6/18/19</a:t>
+              <a:t>6/20/19</a:t>
             </a:fld>
             <a:endParaRPr lang="de-DE" dirty="0"/>
           </a:p>
@@ -3904,7 +3904,7 @@
           <a:p>
             <a:fld id="{DDB1F609-DF0A-431B-B7BF-4A3DF144245D}" type="datetimeFigureOut">
               <a:rPr lang="de-DE" smtClean="0"/>
-              <a:t>6/18/19</a:t>
+              <a:t>6/20/19</a:t>
             </a:fld>
             <a:endParaRPr lang="de-DE" dirty="0"/>
           </a:p>
@@ -4273,7 +4273,7 @@
           <a:p>
             <a:fld id="{DDB1F609-DF0A-431B-B7BF-4A3DF144245D}" type="datetimeFigureOut">
               <a:rPr lang="de-DE" smtClean="0"/>
-              <a:t>6/18/19</a:t>
+              <a:t>6/20/19</a:t>
             </a:fld>
             <a:endParaRPr lang="de-DE" dirty="0"/>
           </a:p>
@@ -4391,7 +4391,7 @@
           <a:p>
             <a:fld id="{DDB1F609-DF0A-431B-B7BF-4A3DF144245D}" type="datetimeFigureOut">
               <a:rPr lang="de-DE" smtClean="0"/>
-              <a:t>6/18/19</a:t>
+              <a:t>6/20/19</a:t>
             </a:fld>
             <a:endParaRPr lang="de-DE" dirty="0"/>
           </a:p>
@@ -4481,7 +4481,7 @@
           <a:p>
             <a:fld id="{DDB1F609-DF0A-431B-B7BF-4A3DF144245D}" type="datetimeFigureOut">
               <a:rPr lang="de-DE" smtClean="0"/>
-              <a:t>6/18/19</a:t>
+              <a:t>6/20/19</a:t>
             </a:fld>
             <a:endParaRPr lang="de-DE" dirty="0"/>
           </a:p>
@@ -4731,7 +4731,7 @@
           <a:p>
             <a:fld id="{DDB1F609-DF0A-431B-B7BF-4A3DF144245D}" type="datetimeFigureOut">
               <a:rPr lang="de-DE" smtClean="0"/>
-              <a:t>6/18/19</a:t>
+              <a:t>6/20/19</a:t>
             </a:fld>
             <a:endParaRPr lang="de-DE" dirty="0"/>
           </a:p>
@@ -5031,7 +5031,7 @@
           <a:p>
             <a:fld id="{DDB1F609-DF0A-431B-B7BF-4A3DF144245D}" type="datetimeFigureOut">
               <a:rPr lang="de-DE" smtClean="0"/>
-              <a:t>6/18/19</a:t>
+              <a:t>6/20/19</a:t>
             </a:fld>
             <a:endParaRPr lang="de-DE" dirty="0"/>
           </a:p>
@@ -5728,7 +5728,7 @@
           <a:p>
             <a:fld id="{DDB1F609-DF0A-431B-B7BF-4A3DF144245D}" type="datetimeFigureOut">
               <a:rPr lang="de-DE" smtClean="0"/>
-              <a:t>6/18/19</a:t>
+              <a:t>6/20/19</a:t>
             </a:fld>
             <a:endParaRPr lang="de-DE" dirty="0"/>
           </a:p>
@@ -6338,7 +6338,7 @@
         <p:spPr>
           <a:xfrm>
             <a:off x="1991544" y="4581128"/>
-            <a:ext cx="6191255" cy="1152128"/>
+            <a:ext cx="6191255" cy="1512168"/>
           </a:xfrm>
         </p:spPr>
         <p:txBody>
@@ -6349,7 +6349,7 @@
           <a:p>
             <a:pPr algn="ctr"/>
             <a:r>
-              <a:rPr lang="de-DE" sz="3200" i="1" dirty="0" smtClean="0">
+              <a:rPr lang="de-DE" sz="2800" i="1" dirty="0" smtClean="0">
                 <a:solidFill>
                   <a:schemeClr val="tx1"/>
                 </a:solidFill>
@@ -6360,16 +6360,56 @@
           <a:p>
             <a:pPr algn="ctr"/>
             <a:r>
-              <a:rPr lang="de-DE" sz="3200" i="1" dirty="0" smtClean="0">
+              <a:rPr lang="de-DE" sz="2800" i="1" dirty="0" smtClean="0">
                 <a:solidFill>
                   <a:schemeClr val="tx1"/>
                 </a:solidFill>
               </a:rPr>
-              <a:t>June 19, 2019</a:t>
-            </a:r>
-          </a:p>
-          <a:p>
-            <a:endParaRPr lang="en-GB" dirty="0"/>
+              <a:t>June 19, </a:t>
+            </a:r>
+            <a:r>
+              <a:rPr lang="de-DE" sz="2800" i="1" dirty="0" smtClean="0">
+                <a:solidFill>
+                  <a:schemeClr val="tx1"/>
+                </a:solidFill>
+              </a:rPr>
+              <a:t>2019</a:t>
+            </a:r>
+          </a:p>
+          <a:p>
+            <a:pPr algn="ctr"/>
+            <a:r>
+              <a:rPr lang="es-ES_tradnl" sz="2800" i="1" dirty="0" err="1" smtClean="0">
+                <a:solidFill>
+                  <a:schemeClr val="tx1"/>
+                </a:solidFill>
+              </a:rPr>
+              <a:t>bit.ly</a:t>
+            </a:r>
+            <a:r>
+              <a:rPr lang="es-ES_tradnl" sz="2800" i="1" dirty="0">
+                <a:solidFill>
+                  <a:schemeClr val="tx1"/>
+                </a:solidFill>
+              </a:rPr>
+              <a:t>/</a:t>
+            </a:r>
+            <a:r>
+              <a:rPr lang="es-ES_tradnl" sz="2800" i="1" dirty="0" err="1">
+                <a:solidFill>
+                  <a:schemeClr val="tx1"/>
+                </a:solidFill>
+              </a:rPr>
+              <a:t>hispus_cdm</a:t>
+            </a:r>
+            <a:endParaRPr lang="de-DE" sz="2800" i="1" dirty="0" smtClean="0">
+              <a:solidFill>
+                <a:schemeClr val="tx1"/>
+              </a:solidFill>
+            </a:endParaRPr>
+          </a:p>
+          <a:p>
+            <a:endParaRPr lang="en-GB" sz="2800" dirty="0"/>
           </a:p>
         </p:txBody>
       </p:sp>
@@ -13454,8 +13494,16 @@
           <a:lstStyle/>
           <a:p>
             <a:r>
+              <a:rPr lang="en-US" altLang="en-US" sz="2800" dirty="0" err="1" smtClean="0"/>
+              <a:t>Modelling</a:t>
+            </a:r>
+            <a:r>
               <a:rPr lang="en-US" altLang="en-US" sz="2800" dirty="0" smtClean="0"/>
-              <a:t>PEPFAR use case: Complex data modelling</a:t>
+              <a:t> </a:t>
+            </a:r>
+            <a:r>
+              <a:rPr lang="en-US" altLang="en-US" sz="2800" dirty="0"/>
+              <a:t>PEPFAR agencies and partners</a:t>
             </a:r>
             <a:endParaRPr lang="x-none" altLang="en-US" sz="2800" dirty="0" smtClean="0"/>
           </a:p>
@@ -13650,7 +13698,19 @@
           <a:p>
             <a:r>
               <a:rPr lang="en-US" altLang="en-US" sz="2800" dirty="0"/>
-              <a:t> Modeling PEPFAR </a:t>
+              <a:t> </a:t>
+            </a:r>
+            <a:r>
+              <a:rPr lang="en-US" altLang="en-US" sz="2800" dirty="0" err="1" smtClean="0"/>
+              <a:t>Modelling</a:t>
+            </a:r>
+            <a:r>
+              <a:rPr lang="en-US" altLang="en-US" sz="2800" dirty="0" smtClean="0"/>
+              <a:t> </a:t>
+            </a:r>
+            <a:r>
+              <a:rPr lang="en-US" altLang="en-US" sz="2800" dirty="0"/>
+              <a:t>PEPFAR </a:t>
             </a:r>
             <a:r>
               <a:rPr lang="en-US" altLang="en-US" sz="2800" dirty="0" smtClean="0"/>
@@ -18028,7 +18088,7 @@
         </p:nvSpPr>
         <p:spPr>
           <a:xfrm>
-            <a:off x="516385" y="491078"/>
+            <a:off x="516385" y="476672"/>
             <a:ext cx="8314266" cy="719656"/>
           </a:xfrm>
         </p:spPr>
@@ -19223,8 +19283,12 @@
           <a:lstStyle/>
           <a:p>
             <a:r>
-              <a:rPr lang="en-US" altLang="en-US" sz="2800" dirty="0" smtClean="0"/>
-              <a:t>PEPFAR use case: Complex data modelling</a:t>
+              <a:rPr lang="en-US" altLang="en-US" sz="2800" dirty="0" err="1"/>
+              <a:t>Modelling</a:t>
+            </a:r>
+            <a:r>
+              <a:rPr lang="en-US" altLang="en-US" sz="2800" dirty="0"/>
+              <a:t> PEPFAR data approval</a:t>
             </a:r>
             <a:endParaRPr lang="x-none" altLang="en-US" sz="2800" dirty="0" smtClean="0"/>
           </a:p>
@@ -19479,7 +19543,7 @@
           <a:p>
             <a:r>
               <a:rPr lang="en-US" altLang="en-US" sz="2800" dirty="0" smtClean="0"/>
-              <a:t>Modelling PEPFAR Data approval</a:t>
+              <a:t>Modelling PEPFAR data approval</a:t>
             </a:r>
             <a:endParaRPr lang="x-none" altLang="en-US" sz="2800" dirty="0" smtClean="0"/>
           </a:p>
@@ -25858,10 +25922,17 @@
           <a:lstStyle/>
           <a:p>
             <a:r>
-              <a:rPr lang="en-US" altLang="en-US" sz="2800" dirty="0" smtClean="0"/>
-              <a:t>PEPFAR use case: Complex data modelling</a:t>
-            </a:r>
-            <a:endParaRPr lang="x-none" altLang="en-US" sz="2800" dirty="0" smtClean="0"/>
+              <a:rPr lang="en-US" altLang="en-US" sz="4000" dirty="0" smtClean="0"/>
+              <a:t>PEPFAR use case: </a:t>
+            </a:r>
+            <a:br>
+              <a:rPr lang="en-US" altLang="en-US" sz="4000" dirty="0" smtClean="0"/>
+            </a:br>
+            <a:r>
+              <a:rPr lang="en-US" altLang="en-US" sz="4000" dirty="0" smtClean="0"/>
+              <a:t>Complex data modelling</a:t>
+            </a:r>
+            <a:endParaRPr lang="x-none" altLang="en-US" sz="4000" dirty="0" smtClean="0"/>
           </a:p>
         </p:txBody>
       </p:sp>
@@ -27359,10 +27430,17 @@
           <a:lstStyle/>
           <a:p>
             <a:r>
-              <a:rPr lang="en-US" altLang="en-US" sz="2800" dirty="0" smtClean="0"/>
-              <a:t>PEPFAR use case: Complex data modelling</a:t>
-            </a:r>
-            <a:endParaRPr lang="x-none" altLang="en-US" sz="2800" dirty="0" smtClean="0"/>
+              <a:rPr lang="en-US" altLang="en-US" sz="4000" dirty="0" smtClean="0"/>
+              <a:t>PEPFAR use case: </a:t>
+            </a:r>
+            <a:br>
+              <a:rPr lang="en-US" altLang="en-US" sz="4000" dirty="0" smtClean="0"/>
+            </a:br>
+            <a:r>
+              <a:rPr lang="en-US" altLang="en-US" sz="4000" dirty="0" smtClean="0"/>
+              <a:t>Complex data modelling</a:t>
+            </a:r>
+            <a:endParaRPr lang="x-none" altLang="en-US" sz="4000" dirty="0" smtClean="0"/>
           </a:p>
         </p:txBody>
       </p:sp>

</xml_diff>